<commit_message>
Work on coverslide et al.
</commit_message>
<xml_diff>
--- a/talks/MEDECOS-2020/slides.pptx
+++ b/talks/MEDECOS-2020/slides.pptx
@@ -2,19 +2,21 @@
 <file path=ppt/presentation.xml><?xml version="1.0" encoding="utf-8"?>
 <p:presentation xmlns:a="http://schemas.openxmlformats.org/drawingml/2006/main" xmlns:r="http://schemas.openxmlformats.org/officeDocument/2006/relationships" xmlns:p="http://schemas.openxmlformats.org/presentationml/2006/main" saveSubsetFonts="1" autoCompressPictures="0">
   <p:sldMasterIdLst>
-    <p:sldMasterId id="2147483648" r:id="rId1"/>
+    <p:sldMasterId id="2147483660" r:id="rId1"/>
   </p:sldMasterIdLst>
   <p:sldIdLst>
-    <p:sldId id="257" r:id="rId2"/>
-    <p:sldId id="256" r:id="rId3"/>
+    <p:sldId id="258" r:id="rId2"/>
+    <p:sldId id="257" r:id="rId3"/>
+    <p:sldId id="256" r:id="rId4"/>
+    <p:sldId id="259" r:id="rId5"/>
   </p:sldIdLst>
-  <p:sldSz cx="12192000" cy="6858000"/>
+  <p:sldSz cx="9144000" cy="6858000" type="screen4x3"/>
   <p:notesSz cx="6858000" cy="9144000"/>
   <p:defaultTextStyle>
     <a:defPPr>
       <a:defRPr lang="en-US"/>
     </a:defPPr>
-    <a:lvl1pPr marL="0" algn="l" defTabSz="914400" rtl="0" eaLnBrk="1" latinLnBrk="0" hangingPunct="1">
+    <a:lvl1pPr marL="0" algn="l" defTabSz="457200" rtl="0" eaLnBrk="1" latinLnBrk="0" hangingPunct="1">
       <a:defRPr sz="1800" kern="1200">
         <a:solidFill>
           <a:schemeClr val="tx1"/>
@@ -24,7 +26,7 @@
         <a:cs typeface="+mn-cs"/>
       </a:defRPr>
     </a:lvl1pPr>
-    <a:lvl2pPr marL="457200" algn="l" defTabSz="914400" rtl="0" eaLnBrk="1" latinLnBrk="0" hangingPunct="1">
+    <a:lvl2pPr marL="457200" algn="l" defTabSz="457200" rtl="0" eaLnBrk="1" latinLnBrk="0" hangingPunct="1">
       <a:defRPr sz="1800" kern="1200">
         <a:solidFill>
           <a:schemeClr val="tx1"/>
@@ -34,7 +36,7 @@
         <a:cs typeface="+mn-cs"/>
       </a:defRPr>
     </a:lvl2pPr>
-    <a:lvl3pPr marL="914400" algn="l" defTabSz="914400" rtl="0" eaLnBrk="1" latinLnBrk="0" hangingPunct="1">
+    <a:lvl3pPr marL="914400" algn="l" defTabSz="457200" rtl="0" eaLnBrk="1" latinLnBrk="0" hangingPunct="1">
       <a:defRPr sz="1800" kern="1200">
         <a:solidFill>
           <a:schemeClr val="tx1"/>
@@ -44,7 +46,7 @@
         <a:cs typeface="+mn-cs"/>
       </a:defRPr>
     </a:lvl3pPr>
-    <a:lvl4pPr marL="1371600" algn="l" defTabSz="914400" rtl="0" eaLnBrk="1" latinLnBrk="0" hangingPunct="1">
+    <a:lvl4pPr marL="1371600" algn="l" defTabSz="457200" rtl="0" eaLnBrk="1" latinLnBrk="0" hangingPunct="1">
       <a:defRPr sz="1800" kern="1200">
         <a:solidFill>
           <a:schemeClr val="tx1"/>
@@ -54,7 +56,7 @@
         <a:cs typeface="+mn-cs"/>
       </a:defRPr>
     </a:lvl4pPr>
-    <a:lvl5pPr marL="1828800" algn="l" defTabSz="914400" rtl="0" eaLnBrk="1" latinLnBrk="0" hangingPunct="1">
+    <a:lvl5pPr marL="1828800" algn="l" defTabSz="457200" rtl="0" eaLnBrk="1" latinLnBrk="0" hangingPunct="1">
       <a:defRPr sz="1800" kern="1200">
         <a:solidFill>
           <a:schemeClr val="tx1"/>
@@ -64,7 +66,7 @@
         <a:cs typeface="+mn-cs"/>
       </a:defRPr>
     </a:lvl5pPr>
-    <a:lvl6pPr marL="2286000" algn="l" defTabSz="914400" rtl="0" eaLnBrk="1" latinLnBrk="0" hangingPunct="1">
+    <a:lvl6pPr marL="2286000" algn="l" defTabSz="457200" rtl="0" eaLnBrk="1" latinLnBrk="0" hangingPunct="1">
       <a:defRPr sz="1800" kern="1200">
         <a:solidFill>
           <a:schemeClr val="tx1"/>
@@ -74,7 +76,7 @@
         <a:cs typeface="+mn-cs"/>
       </a:defRPr>
     </a:lvl6pPr>
-    <a:lvl7pPr marL="2743200" algn="l" defTabSz="914400" rtl="0" eaLnBrk="1" latinLnBrk="0" hangingPunct="1">
+    <a:lvl7pPr marL="2743200" algn="l" defTabSz="457200" rtl="0" eaLnBrk="1" latinLnBrk="0" hangingPunct="1">
       <a:defRPr sz="1800" kern="1200">
         <a:solidFill>
           <a:schemeClr val="tx1"/>
@@ -84,7 +86,7 @@
         <a:cs typeface="+mn-cs"/>
       </a:defRPr>
     </a:lvl7pPr>
-    <a:lvl8pPr marL="3200400" algn="l" defTabSz="914400" rtl="0" eaLnBrk="1" latinLnBrk="0" hangingPunct="1">
+    <a:lvl8pPr marL="3200400" algn="l" defTabSz="457200" rtl="0" eaLnBrk="1" latinLnBrk="0" hangingPunct="1">
       <a:defRPr sz="1800" kern="1200">
         <a:solidFill>
           <a:schemeClr val="tx1"/>
@@ -94,7 +96,7 @@
         <a:cs typeface="+mn-cs"/>
       </a:defRPr>
     </a:lvl8pPr>
-    <a:lvl9pPr marL="3657600" algn="l" defTabSz="914400" rtl="0" eaLnBrk="1" latinLnBrk="0" hangingPunct="1">
+    <a:lvl9pPr marL="3657600" algn="l" defTabSz="457200" rtl="0" eaLnBrk="1" latinLnBrk="0" hangingPunct="1">
       <a:defRPr sz="1800" kern="1200">
         <a:solidFill>
           <a:schemeClr val="tx1"/>
@@ -105,6 +107,11 @@
       </a:defRPr>
     </a:lvl9pPr>
   </p:defaultTextStyle>
+  <p:extLst>
+    <p:ext uri="{EFAFB233-063F-42B5-8137-9DF3F51BA10A}">
+      <p15:sldGuideLst xmlns:p15="http://schemas.microsoft.com/office/powerpoint/2012/main"/>
+    </p:ext>
+  </p:extLst>
 </p:presentation>
 </file>
 
@@ -127,13 +134,7 @@
       </p:grpSpPr>
       <p:sp>
         <p:nvSpPr>
-          <p:cNvPr id="2" name="Title 1">
-            <a:extLst>
-              <a:ext uri="{FF2B5EF4-FFF2-40B4-BE49-F238E27FC236}">
-                <a16:creationId xmlns:a16="http://schemas.microsoft.com/office/drawing/2014/main" id="{2E65EC49-DDF3-0B40-BCDD-BDDA679A7FEC}"/>
-              </a:ext>
-            </a:extLst>
-          </p:cNvPr>
+          <p:cNvPr id="2" name="Title 1"/>
           <p:cNvSpPr>
             <a:spLocks noGrp="1"/>
           </p:cNvSpPr>
@@ -143,8 +144,8 @@
         </p:nvSpPr>
         <p:spPr>
           <a:xfrm>
-            <a:off x="1524000" y="1122363"/>
-            <a:ext cx="9144000" cy="2387600"/>
+            <a:off x="685800" y="1122363"/>
+            <a:ext cx="7772400" cy="2387600"/>
           </a:xfrm>
         </p:spPr>
         <p:txBody>
@@ -159,19 +160,13 @@
               <a:rPr lang="en-GB"/>
               <a:t>Click to edit Master title style</a:t>
             </a:r>
-            <a:endParaRPr lang="en-US"/>
-          </a:p>
-        </p:txBody>
-      </p:sp>
-      <p:sp>
-        <p:nvSpPr>
-          <p:cNvPr id="3" name="Subtitle 2">
-            <a:extLst>
-              <a:ext uri="{FF2B5EF4-FFF2-40B4-BE49-F238E27FC236}">
-                <a16:creationId xmlns:a16="http://schemas.microsoft.com/office/drawing/2014/main" id="{B1E1F7DD-5C7F-F446-BEB8-6A60FF9EB2CD}"/>
-              </a:ext>
-            </a:extLst>
-          </p:cNvPr>
+            <a:endParaRPr lang="en-US" dirty="0"/>
+          </a:p>
+        </p:txBody>
+      </p:sp>
+      <p:sp>
+        <p:nvSpPr>
+          <p:cNvPr id="3" name="Subtitle 2"/>
           <p:cNvSpPr>
             <a:spLocks noGrp="1"/>
           </p:cNvSpPr>
@@ -181,8 +176,8 @@
         </p:nvSpPr>
         <p:spPr>
           <a:xfrm>
-            <a:off x="1524000" y="3602038"/>
-            <a:ext cx="9144000" cy="1655762"/>
+            <a:off x="1143000" y="3602038"/>
+            <a:ext cx="6858000" cy="1655762"/>
           </a:xfrm>
         </p:spPr>
         <p:txBody>
@@ -230,19 +225,13 @@
               <a:rPr lang="en-GB"/>
               <a:t>Click to edit Master subtitle style</a:t>
             </a:r>
-            <a:endParaRPr lang="en-US"/>
-          </a:p>
-        </p:txBody>
-      </p:sp>
-      <p:sp>
-        <p:nvSpPr>
-          <p:cNvPr id="4" name="Date Placeholder 3">
-            <a:extLst>
-              <a:ext uri="{FF2B5EF4-FFF2-40B4-BE49-F238E27FC236}">
-                <a16:creationId xmlns:a16="http://schemas.microsoft.com/office/drawing/2014/main" id="{87B7A2B6-549E-A742-B08B-21021AC08E24}"/>
-              </a:ext>
-            </a:extLst>
-          </p:cNvPr>
+            <a:endParaRPr lang="en-US" dirty="0"/>
+          </a:p>
+        </p:txBody>
+      </p:sp>
+      <p:sp>
+        <p:nvSpPr>
+          <p:cNvPr id="4" name="Date Placeholder 3"/>
           <p:cNvSpPr>
             <a:spLocks noGrp="1"/>
           </p:cNvSpPr>
@@ -257,7 +246,7 @@
           <a:p>
             <a:fld id="{D68DAA29-6983-6346-8A76-F6310C999CFF}" type="datetimeFigureOut">
               <a:rPr lang="en-US" smtClean="0"/>
-              <a:t>2/19/20</a:t>
+              <a:t>2/20/20</a:t>
             </a:fld>
             <a:endParaRPr lang="en-US"/>
           </a:p>
@@ -265,13 +254,7 @@
       </p:sp>
       <p:sp>
         <p:nvSpPr>
-          <p:cNvPr id="5" name="Footer Placeholder 4">
-            <a:extLst>
-              <a:ext uri="{FF2B5EF4-FFF2-40B4-BE49-F238E27FC236}">
-                <a16:creationId xmlns:a16="http://schemas.microsoft.com/office/drawing/2014/main" id="{2CAEC603-8586-3A49-932F-BD4B6992E708}"/>
-              </a:ext>
-            </a:extLst>
-          </p:cNvPr>
+          <p:cNvPr id="5" name="Footer Placeholder 4"/>
           <p:cNvSpPr>
             <a:spLocks noGrp="1"/>
           </p:cNvSpPr>
@@ -290,13 +273,7 @@
       </p:sp>
       <p:sp>
         <p:nvSpPr>
-          <p:cNvPr id="6" name="Slide Number Placeholder 5">
-            <a:extLst>
-              <a:ext uri="{FF2B5EF4-FFF2-40B4-BE49-F238E27FC236}">
-                <a16:creationId xmlns:a16="http://schemas.microsoft.com/office/drawing/2014/main" id="{70BE1583-916D-C340-920E-A85C24226C1C}"/>
-              </a:ext>
-            </a:extLst>
-          </p:cNvPr>
+          <p:cNvPr id="6" name="Slide Number Placeholder 5"/>
           <p:cNvSpPr>
             <a:spLocks noGrp="1"/>
           </p:cNvSpPr>
@@ -320,7 +297,7 @@
     </p:spTree>
     <p:extLst>
       <p:ext uri="{BB962C8B-B14F-4D97-AF65-F5344CB8AC3E}">
-        <p14:creationId xmlns:p14="http://schemas.microsoft.com/office/powerpoint/2010/main" val="1131778403"/>
+        <p14:creationId xmlns:p14="http://schemas.microsoft.com/office/powerpoint/2010/main" val="1226366979"/>
       </p:ext>
     </p:extLst>
   </p:cSld>
@@ -349,13 +326,7 @@
       </p:grpSpPr>
       <p:sp>
         <p:nvSpPr>
-          <p:cNvPr id="2" name="Title 1">
-            <a:extLst>
-              <a:ext uri="{FF2B5EF4-FFF2-40B4-BE49-F238E27FC236}">
-                <a16:creationId xmlns:a16="http://schemas.microsoft.com/office/drawing/2014/main" id="{C3828B80-BE83-D648-9866-6DB89D440939}"/>
-              </a:ext>
-            </a:extLst>
-          </p:cNvPr>
+          <p:cNvPr id="2" name="Title 1"/>
           <p:cNvSpPr>
             <a:spLocks noGrp="1"/>
           </p:cNvSpPr>
@@ -372,19 +343,13 @@
               <a:rPr lang="en-GB"/>
               <a:t>Click to edit Master title style</a:t>
             </a:r>
-            <a:endParaRPr lang="en-US"/>
-          </a:p>
-        </p:txBody>
-      </p:sp>
-      <p:sp>
-        <p:nvSpPr>
-          <p:cNvPr id="3" name="Vertical Text Placeholder 2">
-            <a:extLst>
-              <a:ext uri="{FF2B5EF4-FFF2-40B4-BE49-F238E27FC236}">
-                <a16:creationId xmlns:a16="http://schemas.microsoft.com/office/drawing/2014/main" id="{2088CE95-3BEF-4046-ABA4-F801FD5DD585}"/>
-              </a:ext>
-            </a:extLst>
-          </p:cNvPr>
+            <a:endParaRPr lang="en-US" dirty="0"/>
+          </a:p>
+        </p:txBody>
+      </p:sp>
+      <p:sp>
+        <p:nvSpPr>
+          <p:cNvPr id="3" name="Vertical Text Placeholder 2"/>
           <p:cNvSpPr>
             <a:spLocks noGrp="1"/>
           </p:cNvSpPr>
@@ -430,19 +395,13 @@
               <a:rPr lang="en-GB"/>
               <a:t>Fifth level</a:t>
             </a:r>
-            <a:endParaRPr lang="en-US"/>
-          </a:p>
-        </p:txBody>
-      </p:sp>
-      <p:sp>
-        <p:nvSpPr>
-          <p:cNvPr id="4" name="Date Placeholder 3">
-            <a:extLst>
-              <a:ext uri="{FF2B5EF4-FFF2-40B4-BE49-F238E27FC236}">
-                <a16:creationId xmlns:a16="http://schemas.microsoft.com/office/drawing/2014/main" id="{CCEBD973-6201-0B47-8E2B-F831349142A8}"/>
-              </a:ext>
-            </a:extLst>
-          </p:cNvPr>
+            <a:endParaRPr lang="en-US" dirty="0"/>
+          </a:p>
+        </p:txBody>
+      </p:sp>
+      <p:sp>
+        <p:nvSpPr>
+          <p:cNvPr id="4" name="Date Placeholder 3"/>
           <p:cNvSpPr>
             <a:spLocks noGrp="1"/>
           </p:cNvSpPr>
@@ -457,7 +416,7 @@
           <a:p>
             <a:fld id="{D68DAA29-6983-6346-8A76-F6310C999CFF}" type="datetimeFigureOut">
               <a:rPr lang="en-US" smtClean="0"/>
-              <a:t>2/19/20</a:t>
+              <a:t>2/20/20</a:t>
             </a:fld>
             <a:endParaRPr lang="en-US"/>
           </a:p>
@@ -465,13 +424,7 @@
       </p:sp>
       <p:sp>
         <p:nvSpPr>
-          <p:cNvPr id="5" name="Footer Placeholder 4">
-            <a:extLst>
-              <a:ext uri="{FF2B5EF4-FFF2-40B4-BE49-F238E27FC236}">
-                <a16:creationId xmlns:a16="http://schemas.microsoft.com/office/drawing/2014/main" id="{692439E5-A79C-294F-A7AF-C0F065B9029A}"/>
-              </a:ext>
-            </a:extLst>
-          </p:cNvPr>
+          <p:cNvPr id="5" name="Footer Placeholder 4"/>
           <p:cNvSpPr>
             <a:spLocks noGrp="1"/>
           </p:cNvSpPr>
@@ -490,13 +443,7 @@
       </p:sp>
       <p:sp>
         <p:nvSpPr>
-          <p:cNvPr id="6" name="Slide Number Placeholder 5">
-            <a:extLst>
-              <a:ext uri="{FF2B5EF4-FFF2-40B4-BE49-F238E27FC236}">
-                <a16:creationId xmlns:a16="http://schemas.microsoft.com/office/drawing/2014/main" id="{60E8271D-8991-8D44-A1C9-AC7A20BC36C3}"/>
-              </a:ext>
-            </a:extLst>
-          </p:cNvPr>
+          <p:cNvPr id="6" name="Slide Number Placeholder 5"/>
           <p:cNvSpPr>
             <a:spLocks noGrp="1"/>
           </p:cNvSpPr>
@@ -520,7 +467,7 @@
     </p:spTree>
     <p:extLst>
       <p:ext uri="{BB962C8B-B14F-4D97-AF65-F5344CB8AC3E}">
-        <p14:creationId xmlns:p14="http://schemas.microsoft.com/office/powerpoint/2010/main" val="3021253859"/>
+        <p14:creationId xmlns:p14="http://schemas.microsoft.com/office/powerpoint/2010/main" val="2683804807"/>
       </p:ext>
     </p:extLst>
   </p:cSld>
@@ -549,13 +496,7 @@
       </p:grpSpPr>
       <p:sp>
         <p:nvSpPr>
-          <p:cNvPr id="2" name="Vertical Title 1">
-            <a:extLst>
-              <a:ext uri="{FF2B5EF4-FFF2-40B4-BE49-F238E27FC236}">
-                <a16:creationId xmlns:a16="http://schemas.microsoft.com/office/drawing/2014/main" id="{B2E325D0-AD53-4140-B431-AF90723022D5}"/>
-              </a:ext>
-            </a:extLst>
-          </p:cNvPr>
+          <p:cNvPr id="2" name="Vertical Title 1"/>
           <p:cNvSpPr>
             <a:spLocks noGrp="1"/>
           </p:cNvSpPr>
@@ -565,8 +506,8 @@
         </p:nvSpPr>
         <p:spPr>
           <a:xfrm>
-            <a:off x="8724900" y="365125"/>
-            <a:ext cx="2628900" cy="5811838"/>
+            <a:off x="6543675" y="365125"/>
+            <a:ext cx="1971675" cy="5811838"/>
           </a:xfrm>
         </p:spPr>
         <p:txBody>
@@ -577,19 +518,13 @@
               <a:rPr lang="en-GB"/>
               <a:t>Click to edit Master title style</a:t>
             </a:r>
-            <a:endParaRPr lang="en-US"/>
-          </a:p>
-        </p:txBody>
-      </p:sp>
-      <p:sp>
-        <p:nvSpPr>
-          <p:cNvPr id="3" name="Vertical Text Placeholder 2">
-            <a:extLst>
-              <a:ext uri="{FF2B5EF4-FFF2-40B4-BE49-F238E27FC236}">
-                <a16:creationId xmlns:a16="http://schemas.microsoft.com/office/drawing/2014/main" id="{C70B02E3-451F-9C4A-A4F1-32295496750D}"/>
-              </a:ext>
-            </a:extLst>
-          </p:cNvPr>
+            <a:endParaRPr lang="en-US" dirty="0"/>
+          </a:p>
+        </p:txBody>
+      </p:sp>
+      <p:sp>
+        <p:nvSpPr>
+          <p:cNvPr id="3" name="Vertical Text Placeholder 2"/>
           <p:cNvSpPr>
             <a:spLocks noGrp="1"/>
           </p:cNvSpPr>
@@ -599,8 +534,8 @@
         </p:nvSpPr>
         <p:spPr>
           <a:xfrm>
-            <a:off x="838200" y="365125"/>
-            <a:ext cx="7734300" cy="5811838"/>
+            <a:off x="628650" y="365125"/>
+            <a:ext cx="5800725" cy="5811838"/>
           </a:xfrm>
         </p:spPr>
         <p:txBody>
@@ -640,19 +575,13 @@
               <a:rPr lang="en-GB"/>
               <a:t>Fifth level</a:t>
             </a:r>
-            <a:endParaRPr lang="en-US"/>
-          </a:p>
-        </p:txBody>
-      </p:sp>
-      <p:sp>
-        <p:nvSpPr>
-          <p:cNvPr id="4" name="Date Placeholder 3">
-            <a:extLst>
-              <a:ext uri="{FF2B5EF4-FFF2-40B4-BE49-F238E27FC236}">
-                <a16:creationId xmlns:a16="http://schemas.microsoft.com/office/drawing/2014/main" id="{8BD1EC7E-E180-9D42-B3CA-E04CD5CA71F1}"/>
-              </a:ext>
-            </a:extLst>
-          </p:cNvPr>
+            <a:endParaRPr lang="en-US" dirty="0"/>
+          </a:p>
+        </p:txBody>
+      </p:sp>
+      <p:sp>
+        <p:nvSpPr>
+          <p:cNvPr id="4" name="Date Placeholder 3"/>
           <p:cNvSpPr>
             <a:spLocks noGrp="1"/>
           </p:cNvSpPr>
@@ -667,7 +596,7 @@
           <a:p>
             <a:fld id="{D68DAA29-6983-6346-8A76-F6310C999CFF}" type="datetimeFigureOut">
               <a:rPr lang="en-US" smtClean="0"/>
-              <a:t>2/19/20</a:t>
+              <a:t>2/20/20</a:t>
             </a:fld>
             <a:endParaRPr lang="en-US"/>
           </a:p>
@@ -675,13 +604,7 @@
       </p:sp>
       <p:sp>
         <p:nvSpPr>
-          <p:cNvPr id="5" name="Footer Placeholder 4">
-            <a:extLst>
-              <a:ext uri="{FF2B5EF4-FFF2-40B4-BE49-F238E27FC236}">
-                <a16:creationId xmlns:a16="http://schemas.microsoft.com/office/drawing/2014/main" id="{60889C6E-A8B2-E742-AEC2-C42107C55DFE}"/>
-              </a:ext>
-            </a:extLst>
-          </p:cNvPr>
+          <p:cNvPr id="5" name="Footer Placeholder 4"/>
           <p:cNvSpPr>
             <a:spLocks noGrp="1"/>
           </p:cNvSpPr>
@@ -700,13 +623,7 @@
       </p:sp>
       <p:sp>
         <p:nvSpPr>
-          <p:cNvPr id="6" name="Slide Number Placeholder 5">
-            <a:extLst>
-              <a:ext uri="{FF2B5EF4-FFF2-40B4-BE49-F238E27FC236}">
-                <a16:creationId xmlns:a16="http://schemas.microsoft.com/office/drawing/2014/main" id="{6EAC9635-A656-0B49-9FD0-C18278AC8747}"/>
-              </a:ext>
-            </a:extLst>
-          </p:cNvPr>
+          <p:cNvPr id="6" name="Slide Number Placeholder 5"/>
           <p:cNvSpPr>
             <a:spLocks noGrp="1"/>
           </p:cNvSpPr>
@@ -730,7 +647,98 @@
     </p:spTree>
     <p:extLst>
       <p:ext uri="{BB962C8B-B14F-4D97-AF65-F5344CB8AC3E}">
-        <p14:creationId xmlns:p14="http://schemas.microsoft.com/office/powerpoint/2010/main" val="1686558438"/>
+        <p14:creationId xmlns:p14="http://schemas.microsoft.com/office/powerpoint/2010/main" val="3896090680"/>
+      </p:ext>
+    </p:extLst>
+  </p:cSld>
+  <p:clrMapOvr>
+    <a:masterClrMapping/>
+  </p:clrMapOvr>
+</p:sldLayout>
+</file>
+
+<file path=ppt/slideLayouts/slideLayout12.xml><?xml version="1.0" encoding="utf-8"?>
+<p:sldLayout xmlns:a="http://schemas.openxmlformats.org/drawingml/2006/main" xmlns:r="http://schemas.openxmlformats.org/officeDocument/2006/relationships" xmlns:p="http://schemas.openxmlformats.org/presentationml/2006/main" type="obj">
+  <p:cSld name="Title, Content">
+    <p:spTree>
+      <p:nvGrpSpPr>
+        <p:cNvPr id="1" name=""/>
+        <p:cNvGrpSpPr/>
+        <p:nvPr/>
+      </p:nvGrpSpPr>
+      <p:grpSpPr>
+        <a:xfrm>
+          <a:off x="0" y="0"/>
+          <a:ext cx="0" cy="0"/>
+          <a:chOff x="0" y="0"/>
+          <a:chExt cx="0" cy="0"/>
+        </a:xfrm>
+      </p:grpSpPr>
+      <p:sp>
+        <p:nvSpPr>
+          <p:cNvPr id="4" name="PlaceHolder 1"/>
+          <p:cNvSpPr>
+            <a:spLocks noGrp="1"/>
+          </p:cNvSpPr>
+          <p:nvPr>
+            <p:ph type="title"/>
+          </p:nvPr>
+        </p:nvSpPr>
+        <p:spPr>
+          <a:xfrm>
+            <a:off x="1143000" y="1122480"/>
+            <a:ext cx="6857280" cy="2386800"/>
+          </a:xfrm>
+          <a:prstGeom prst="rect">
+            <a:avLst/>
+          </a:prstGeom>
+        </p:spPr>
+        <p:txBody>
+          <a:bodyPr lIns="0" tIns="0" rIns="0" bIns="0" anchor="ctr"/>
+          <a:lstStyle/>
+          <a:p>
+            <a:pPr algn="ctr"/>
+            <a:endParaRPr lang="en-GB" sz="4400" b="0" strike="noStrike" spc="-1">
+              <a:latin typeface="Arial"/>
+            </a:endParaRPr>
+          </a:p>
+        </p:txBody>
+      </p:sp>
+      <p:sp>
+        <p:nvSpPr>
+          <p:cNvPr id="5" name="PlaceHolder 2"/>
+          <p:cNvSpPr>
+            <a:spLocks noGrp="1"/>
+          </p:cNvSpPr>
+          <p:nvPr>
+            <p:ph type="body"/>
+          </p:nvPr>
+        </p:nvSpPr>
+        <p:spPr>
+          <a:xfrm>
+            <a:off x="457200" y="1604520"/>
+            <a:ext cx="8229240" cy="3977280"/>
+          </a:xfrm>
+          <a:prstGeom prst="rect">
+            <a:avLst/>
+          </a:prstGeom>
+        </p:spPr>
+        <p:txBody>
+          <a:bodyPr lIns="0" tIns="0" rIns="0" bIns="0">
+            <a:normAutofit/>
+          </a:bodyPr>
+          <a:lstStyle/>
+          <a:p>
+            <a:endParaRPr lang="en-GB" sz="3200" b="0" strike="noStrike" spc="-1">
+              <a:latin typeface="Arial"/>
+            </a:endParaRPr>
+          </a:p>
+        </p:txBody>
+      </p:sp>
+    </p:spTree>
+    <p:extLst>
+      <p:ext uri="{BB962C8B-B14F-4D97-AF65-F5344CB8AC3E}">
+        <p14:creationId xmlns:p14="http://schemas.microsoft.com/office/powerpoint/2010/main" val="3182244306"/>
       </p:ext>
     </p:extLst>
   </p:cSld>
@@ -759,13 +767,7 @@
       </p:grpSpPr>
       <p:sp>
         <p:nvSpPr>
-          <p:cNvPr id="2" name="Title 1">
-            <a:extLst>
-              <a:ext uri="{FF2B5EF4-FFF2-40B4-BE49-F238E27FC236}">
-                <a16:creationId xmlns:a16="http://schemas.microsoft.com/office/drawing/2014/main" id="{9C5C43BD-F737-9E4A-BF89-5CD3B5604DCF}"/>
-              </a:ext>
-            </a:extLst>
-          </p:cNvPr>
+          <p:cNvPr id="2" name="Title 1"/>
           <p:cNvSpPr>
             <a:spLocks noGrp="1"/>
           </p:cNvSpPr>
@@ -782,19 +784,13 @@
               <a:rPr lang="en-GB"/>
               <a:t>Click to edit Master title style</a:t>
             </a:r>
-            <a:endParaRPr lang="en-US"/>
-          </a:p>
-        </p:txBody>
-      </p:sp>
-      <p:sp>
-        <p:nvSpPr>
-          <p:cNvPr id="3" name="Content Placeholder 2">
-            <a:extLst>
-              <a:ext uri="{FF2B5EF4-FFF2-40B4-BE49-F238E27FC236}">
-                <a16:creationId xmlns:a16="http://schemas.microsoft.com/office/drawing/2014/main" id="{4BA103EB-2D87-7F40-82F4-07CACF819102}"/>
-              </a:ext>
-            </a:extLst>
-          </p:cNvPr>
+            <a:endParaRPr lang="en-US" dirty="0"/>
+          </a:p>
+        </p:txBody>
+      </p:sp>
+      <p:sp>
+        <p:nvSpPr>
+          <p:cNvPr id="3" name="Content Placeholder 2"/>
           <p:cNvSpPr>
             <a:spLocks noGrp="1"/>
           </p:cNvSpPr>
@@ -840,19 +836,13 @@
               <a:rPr lang="en-GB"/>
               <a:t>Fifth level</a:t>
             </a:r>
-            <a:endParaRPr lang="en-US"/>
-          </a:p>
-        </p:txBody>
-      </p:sp>
-      <p:sp>
-        <p:nvSpPr>
-          <p:cNvPr id="4" name="Date Placeholder 3">
-            <a:extLst>
-              <a:ext uri="{FF2B5EF4-FFF2-40B4-BE49-F238E27FC236}">
-                <a16:creationId xmlns:a16="http://schemas.microsoft.com/office/drawing/2014/main" id="{F0402673-CB59-F44D-A5E9-2F599AB5B0E7}"/>
-              </a:ext>
-            </a:extLst>
-          </p:cNvPr>
+            <a:endParaRPr lang="en-US" dirty="0"/>
+          </a:p>
+        </p:txBody>
+      </p:sp>
+      <p:sp>
+        <p:nvSpPr>
+          <p:cNvPr id="4" name="Date Placeholder 3"/>
           <p:cNvSpPr>
             <a:spLocks noGrp="1"/>
           </p:cNvSpPr>
@@ -867,7 +857,7 @@
           <a:p>
             <a:fld id="{D68DAA29-6983-6346-8A76-F6310C999CFF}" type="datetimeFigureOut">
               <a:rPr lang="en-US" smtClean="0"/>
-              <a:t>2/19/20</a:t>
+              <a:t>2/20/20</a:t>
             </a:fld>
             <a:endParaRPr lang="en-US"/>
           </a:p>
@@ -875,13 +865,7 @@
       </p:sp>
       <p:sp>
         <p:nvSpPr>
-          <p:cNvPr id="5" name="Footer Placeholder 4">
-            <a:extLst>
-              <a:ext uri="{FF2B5EF4-FFF2-40B4-BE49-F238E27FC236}">
-                <a16:creationId xmlns:a16="http://schemas.microsoft.com/office/drawing/2014/main" id="{F71A2EA8-EC71-CD4F-BA4E-E1FCF971032C}"/>
-              </a:ext>
-            </a:extLst>
-          </p:cNvPr>
+          <p:cNvPr id="5" name="Footer Placeholder 4"/>
           <p:cNvSpPr>
             <a:spLocks noGrp="1"/>
           </p:cNvSpPr>
@@ -900,13 +884,7 @@
       </p:sp>
       <p:sp>
         <p:nvSpPr>
-          <p:cNvPr id="6" name="Slide Number Placeholder 5">
-            <a:extLst>
-              <a:ext uri="{FF2B5EF4-FFF2-40B4-BE49-F238E27FC236}">
-                <a16:creationId xmlns:a16="http://schemas.microsoft.com/office/drawing/2014/main" id="{53E36D8D-68A6-9847-92E1-3F040F452AF8}"/>
-              </a:ext>
-            </a:extLst>
-          </p:cNvPr>
+          <p:cNvPr id="6" name="Slide Number Placeholder 5"/>
           <p:cNvSpPr>
             <a:spLocks noGrp="1"/>
           </p:cNvSpPr>
@@ -930,7 +908,7 @@
     </p:spTree>
     <p:extLst>
       <p:ext uri="{BB962C8B-B14F-4D97-AF65-F5344CB8AC3E}">
-        <p14:creationId xmlns:p14="http://schemas.microsoft.com/office/powerpoint/2010/main" val="1156474786"/>
+        <p14:creationId xmlns:p14="http://schemas.microsoft.com/office/powerpoint/2010/main" val="2692515535"/>
       </p:ext>
     </p:extLst>
   </p:cSld>
@@ -959,13 +937,7 @@
       </p:grpSpPr>
       <p:sp>
         <p:nvSpPr>
-          <p:cNvPr id="2" name="Title 1">
-            <a:extLst>
-              <a:ext uri="{FF2B5EF4-FFF2-40B4-BE49-F238E27FC236}">
-                <a16:creationId xmlns:a16="http://schemas.microsoft.com/office/drawing/2014/main" id="{E98E7158-827A-ED4E-99FF-FE69291122B1}"/>
-              </a:ext>
-            </a:extLst>
-          </p:cNvPr>
+          <p:cNvPr id="2" name="Title 1"/>
           <p:cNvSpPr>
             <a:spLocks noGrp="1"/>
           </p:cNvSpPr>
@@ -975,8 +947,8 @@
         </p:nvSpPr>
         <p:spPr>
           <a:xfrm>
-            <a:off x="831850" y="1709738"/>
-            <a:ext cx="10515600" cy="2852737"/>
+            <a:off x="623888" y="1709739"/>
+            <a:ext cx="7886700" cy="2852737"/>
           </a:xfrm>
         </p:spPr>
         <p:txBody>
@@ -991,19 +963,13 @@
               <a:rPr lang="en-GB"/>
               <a:t>Click to edit Master title style</a:t>
             </a:r>
-            <a:endParaRPr lang="en-US"/>
-          </a:p>
-        </p:txBody>
-      </p:sp>
-      <p:sp>
-        <p:nvSpPr>
-          <p:cNvPr id="3" name="Text Placeholder 2">
-            <a:extLst>
-              <a:ext uri="{FF2B5EF4-FFF2-40B4-BE49-F238E27FC236}">
-                <a16:creationId xmlns:a16="http://schemas.microsoft.com/office/drawing/2014/main" id="{1EED857F-6A49-3B4B-9C9B-CD9F231183E5}"/>
-              </a:ext>
-            </a:extLst>
-          </p:cNvPr>
+            <a:endParaRPr lang="en-US" dirty="0"/>
+          </a:p>
+        </p:txBody>
+      </p:sp>
+      <p:sp>
+        <p:nvSpPr>
+          <p:cNvPr id="3" name="Text Placeholder 2"/>
           <p:cNvSpPr>
             <a:spLocks noGrp="1"/>
           </p:cNvSpPr>
@@ -1013,8 +979,8 @@
         </p:nvSpPr>
         <p:spPr>
           <a:xfrm>
-            <a:off x="831850" y="4589463"/>
-            <a:ext cx="10515600" cy="1500187"/>
+            <a:off x="623888" y="4589464"/>
+            <a:ext cx="7886700" cy="1500187"/>
           </a:xfrm>
         </p:spPr>
         <p:txBody>
@@ -1024,9 +990,7 @@
               <a:buNone/>
               <a:defRPr sz="2400">
                 <a:solidFill>
-                  <a:schemeClr val="tx1">
-                    <a:tint val="75000"/>
-                  </a:schemeClr>
+                  <a:schemeClr val="tx1"/>
                 </a:solidFill>
               </a:defRPr>
             </a:lvl1pPr>
@@ -1122,13 +1086,7 @@
       </p:sp>
       <p:sp>
         <p:nvSpPr>
-          <p:cNvPr id="4" name="Date Placeholder 3">
-            <a:extLst>
-              <a:ext uri="{FF2B5EF4-FFF2-40B4-BE49-F238E27FC236}">
-                <a16:creationId xmlns:a16="http://schemas.microsoft.com/office/drawing/2014/main" id="{B75A902F-DAEC-4846-944A-F7F52940D1DB}"/>
-              </a:ext>
-            </a:extLst>
-          </p:cNvPr>
+          <p:cNvPr id="4" name="Date Placeholder 3"/>
           <p:cNvSpPr>
             <a:spLocks noGrp="1"/>
           </p:cNvSpPr>
@@ -1143,7 +1101,7 @@
           <a:p>
             <a:fld id="{D68DAA29-6983-6346-8A76-F6310C999CFF}" type="datetimeFigureOut">
               <a:rPr lang="en-US" smtClean="0"/>
-              <a:t>2/19/20</a:t>
+              <a:t>2/20/20</a:t>
             </a:fld>
             <a:endParaRPr lang="en-US"/>
           </a:p>
@@ -1151,13 +1109,7 @@
       </p:sp>
       <p:sp>
         <p:nvSpPr>
-          <p:cNvPr id="5" name="Footer Placeholder 4">
-            <a:extLst>
-              <a:ext uri="{FF2B5EF4-FFF2-40B4-BE49-F238E27FC236}">
-                <a16:creationId xmlns:a16="http://schemas.microsoft.com/office/drawing/2014/main" id="{5A41EA8F-B0FB-E549-B313-E4C68C01005E}"/>
-              </a:ext>
-            </a:extLst>
-          </p:cNvPr>
+          <p:cNvPr id="5" name="Footer Placeholder 4"/>
           <p:cNvSpPr>
             <a:spLocks noGrp="1"/>
           </p:cNvSpPr>
@@ -1176,13 +1128,7 @@
       </p:sp>
       <p:sp>
         <p:nvSpPr>
-          <p:cNvPr id="6" name="Slide Number Placeholder 5">
-            <a:extLst>
-              <a:ext uri="{FF2B5EF4-FFF2-40B4-BE49-F238E27FC236}">
-                <a16:creationId xmlns:a16="http://schemas.microsoft.com/office/drawing/2014/main" id="{D4918B20-48D0-F547-B921-D61F8677FC18}"/>
-              </a:ext>
-            </a:extLst>
-          </p:cNvPr>
+          <p:cNvPr id="6" name="Slide Number Placeholder 5"/>
           <p:cNvSpPr>
             <a:spLocks noGrp="1"/>
           </p:cNvSpPr>
@@ -1206,7 +1152,7 @@
     </p:spTree>
     <p:extLst>
       <p:ext uri="{BB962C8B-B14F-4D97-AF65-F5344CB8AC3E}">
-        <p14:creationId xmlns:p14="http://schemas.microsoft.com/office/powerpoint/2010/main" val="1264386482"/>
+        <p14:creationId xmlns:p14="http://schemas.microsoft.com/office/powerpoint/2010/main" val="773110721"/>
       </p:ext>
     </p:extLst>
   </p:cSld>
@@ -1235,13 +1181,7 @@
       </p:grpSpPr>
       <p:sp>
         <p:nvSpPr>
-          <p:cNvPr id="2" name="Title 1">
-            <a:extLst>
-              <a:ext uri="{FF2B5EF4-FFF2-40B4-BE49-F238E27FC236}">
-                <a16:creationId xmlns:a16="http://schemas.microsoft.com/office/drawing/2014/main" id="{B51399B6-0217-1247-93C5-5E0CE48BDE5D}"/>
-              </a:ext>
-            </a:extLst>
-          </p:cNvPr>
+          <p:cNvPr id="2" name="Title 1"/>
           <p:cNvSpPr>
             <a:spLocks noGrp="1"/>
           </p:cNvSpPr>
@@ -1258,19 +1198,13 @@
               <a:rPr lang="en-GB"/>
               <a:t>Click to edit Master title style</a:t>
             </a:r>
-            <a:endParaRPr lang="en-US"/>
-          </a:p>
-        </p:txBody>
-      </p:sp>
-      <p:sp>
-        <p:nvSpPr>
-          <p:cNvPr id="3" name="Content Placeholder 2">
-            <a:extLst>
-              <a:ext uri="{FF2B5EF4-FFF2-40B4-BE49-F238E27FC236}">
-                <a16:creationId xmlns:a16="http://schemas.microsoft.com/office/drawing/2014/main" id="{40CF75AF-DE02-2D4A-B3EE-49C284C47864}"/>
-              </a:ext>
-            </a:extLst>
-          </p:cNvPr>
+            <a:endParaRPr lang="en-US" dirty="0"/>
+          </a:p>
+        </p:txBody>
+      </p:sp>
+      <p:sp>
+        <p:nvSpPr>
+          <p:cNvPr id="3" name="Content Placeholder 2"/>
           <p:cNvSpPr>
             <a:spLocks noGrp="1"/>
           </p:cNvSpPr>
@@ -1280,8 +1214,8 @@
         </p:nvSpPr>
         <p:spPr>
           <a:xfrm>
-            <a:off x="838200" y="1825625"/>
-            <a:ext cx="5181600" cy="4351338"/>
+            <a:off x="628650" y="1825625"/>
+            <a:ext cx="3886200" cy="4351338"/>
           </a:xfrm>
         </p:spPr>
         <p:txBody>
@@ -1321,19 +1255,13 @@
               <a:rPr lang="en-GB"/>
               <a:t>Fifth level</a:t>
             </a:r>
-            <a:endParaRPr lang="en-US"/>
-          </a:p>
-        </p:txBody>
-      </p:sp>
-      <p:sp>
-        <p:nvSpPr>
-          <p:cNvPr id="4" name="Content Placeholder 3">
-            <a:extLst>
-              <a:ext uri="{FF2B5EF4-FFF2-40B4-BE49-F238E27FC236}">
-                <a16:creationId xmlns:a16="http://schemas.microsoft.com/office/drawing/2014/main" id="{D114C81E-7099-C245-9A70-D5649BA0440B}"/>
-              </a:ext>
-            </a:extLst>
-          </p:cNvPr>
+            <a:endParaRPr lang="en-US" dirty="0"/>
+          </a:p>
+        </p:txBody>
+      </p:sp>
+      <p:sp>
+        <p:nvSpPr>
+          <p:cNvPr id="4" name="Content Placeholder 3"/>
           <p:cNvSpPr>
             <a:spLocks noGrp="1"/>
           </p:cNvSpPr>
@@ -1343,8 +1271,8 @@
         </p:nvSpPr>
         <p:spPr>
           <a:xfrm>
-            <a:off x="6172200" y="1825625"/>
-            <a:ext cx="5181600" cy="4351338"/>
+            <a:off x="4629150" y="1825625"/>
+            <a:ext cx="3886200" cy="4351338"/>
           </a:xfrm>
         </p:spPr>
         <p:txBody>
@@ -1384,19 +1312,13 @@
               <a:rPr lang="en-GB"/>
               <a:t>Fifth level</a:t>
             </a:r>
-            <a:endParaRPr lang="en-US"/>
-          </a:p>
-        </p:txBody>
-      </p:sp>
-      <p:sp>
-        <p:nvSpPr>
-          <p:cNvPr id="5" name="Date Placeholder 4">
-            <a:extLst>
-              <a:ext uri="{FF2B5EF4-FFF2-40B4-BE49-F238E27FC236}">
-                <a16:creationId xmlns:a16="http://schemas.microsoft.com/office/drawing/2014/main" id="{DA8A41F0-F0C4-3D47-9666-10424042AC10}"/>
-              </a:ext>
-            </a:extLst>
-          </p:cNvPr>
+            <a:endParaRPr lang="en-US" dirty="0"/>
+          </a:p>
+        </p:txBody>
+      </p:sp>
+      <p:sp>
+        <p:nvSpPr>
+          <p:cNvPr id="5" name="Date Placeholder 4"/>
           <p:cNvSpPr>
             <a:spLocks noGrp="1"/>
           </p:cNvSpPr>
@@ -1411,7 +1333,7 @@
           <a:p>
             <a:fld id="{D68DAA29-6983-6346-8A76-F6310C999CFF}" type="datetimeFigureOut">
               <a:rPr lang="en-US" smtClean="0"/>
-              <a:t>2/19/20</a:t>
+              <a:t>2/20/20</a:t>
             </a:fld>
             <a:endParaRPr lang="en-US"/>
           </a:p>
@@ -1419,13 +1341,7 @@
       </p:sp>
       <p:sp>
         <p:nvSpPr>
-          <p:cNvPr id="6" name="Footer Placeholder 5">
-            <a:extLst>
-              <a:ext uri="{FF2B5EF4-FFF2-40B4-BE49-F238E27FC236}">
-                <a16:creationId xmlns:a16="http://schemas.microsoft.com/office/drawing/2014/main" id="{58BDCBDA-6645-0143-9D01-E7914C28A2F2}"/>
-              </a:ext>
-            </a:extLst>
-          </p:cNvPr>
+          <p:cNvPr id="6" name="Footer Placeholder 5"/>
           <p:cNvSpPr>
             <a:spLocks noGrp="1"/>
           </p:cNvSpPr>
@@ -1444,13 +1360,7 @@
       </p:sp>
       <p:sp>
         <p:nvSpPr>
-          <p:cNvPr id="7" name="Slide Number Placeholder 6">
-            <a:extLst>
-              <a:ext uri="{FF2B5EF4-FFF2-40B4-BE49-F238E27FC236}">
-                <a16:creationId xmlns:a16="http://schemas.microsoft.com/office/drawing/2014/main" id="{6218EC3F-8B2C-2B4A-9E54-083A27414135}"/>
-              </a:ext>
-            </a:extLst>
-          </p:cNvPr>
+          <p:cNvPr id="7" name="Slide Number Placeholder 6"/>
           <p:cNvSpPr>
             <a:spLocks noGrp="1"/>
           </p:cNvSpPr>
@@ -1474,7 +1384,7 @@
     </p:spTree>
     <p:extLst>
       <p:ext uri="{BB962C8B-B14F-4D97-AF65-F5344CB8AC3E}">
-        <p14:creationId xmlns:p14="http://schemas.microsoft.com/office/powerpoint/2010/main" val="3709431592"/>
+        <p14:creationId xmlns:p14="http://schemas.microsoft.com/office/powerpoint/2010/main" val="3341981883"/>
       </p:ext>
     </p:extLst>
   </p:cSld>
@@ -1503,13 +1413,7 @@
       </p:grpSpPr>
       <p:sp>
         <p:nvSpPr>
-          <p:cNvPr id="2" name="Title 1">
-            <a:extLst>
-              <a:ext uri="{FF2B5EF4-FFF2-40B4-BE49-F238E27FC236}">
-                <a16:creationId xmlns:a16="http://schemas.microsoft.com/office/drawing/2014/main" id="{3CA680DC-6BE5-2B40-BAEC-73E48465F17D}"/>
-              </a:ext>
-            </a:extLst>
-          </p:cNvPr>
+          <p:cNvPr id="2" name="Title 1"/>
           <p:cNvSpPr>
             <a:spLocks noGrp="1"/>
           </p:cNvSpPr>
@@ -1519,8 +1423,8 @@
         </p:nvSpPr>
         <p:spPr>
           <a:xfrm>
-            <a:off x="839788" y="365125"/>
-            <a:ext cx="10515600" cy="1325563"/>
+            <a:off x="629841" y="365126"/>
+            <a:ext cx="7886700" cy="1325563"/>
           </a:xfrm>
         </p:spPr>
         <p:txBody>
@@ -1531,19 +1435,13 @@
               <a:rPr lang="en-GB"/>
               <a:t>Click to edit Master title style</a:t>
             </a:r>
-            <a:endParaRPr lang="en-US"/>
-          </a:p>
-        </p:txBody>
-      </p:sp>
-      <p:sp>
-        <p:nvSpPr>
-          <p:cNvPr id="3" name="Text Placeholder 2">
-            <a:extLst>
-              <a:ext uri="{FF2B5EF4-FFF2-40B4-BE49-F238E27FC236}">
-                <a16:creationId xmlns:a16="http://schemas.microsoft.com/office/drawing/2014/main" id="{045553D6-B343-9D43-905D-C920CD724C53}"/>
-              </a:ext>
-            </a:extLst>
-          </p:cNvPr>
+            <a:endParaRPr lang="en-US" dirty="0"/>
+          </a:p>
+        </p:txBody>
+      </p:sp>
+      <p:sp>
+        <p:nvSpPr>
+          <p:cNvPr id="3" name="Text Placeholder 2"/>
           <p:cNvSpPr>
             <a:spLocks noGrp="1"/>
           </p:cNvSpPr>
@@ -1553,8 +1451,8 @@
         </p:nvSpPr>
         <p:spPr>
           <a:xfrm>
-            <a:off x="839788" y="1681163"/>
-            <a:ext cx="5157787" cy="823912"/>
+            <a:off x="629842" y="1681163"/>
+            <a:ext cx="3868340" cy="823912"/>
           </a:xfrm>
         </p:spPr>
         <p:txBody>
@@ -1608,13 +1506,7 @@
       </p:sp>
       <p:sp>
         <p:nvSpPr>
-          <p:cNvPr id="4" name="Content Placeholder 3">
-            <a:extLst>
-              <a:ext uri="{FF2B5EF4-FFF2-40B4-BE49-F238E27FC236}">
-                <a16:creationId xmlns:a16="http://schemas.microsoft.com/office/drawing/2014/main" id="{B413EE55-1C3C-D64E-961C-5BE864DAA8F5}"/>
-              </a:ext>
-            </a:extLst>
-          </p:cNvPr>
+          <p:cNvPr id="4" name="Content Placeholder 3"/>
           <p:cNvSpPr>
             <a:spLocks noGrp="1"/>
           </p:cNvSpPr>
@@ -1624,8 +1516,8 @@
         </p:nvSpPr>
         <p:spPr>
           <a:xfrm>
-            <a:off x="839788" y="2505075"/>
-            <a:ext cx="5157787" cy="3684588"/>
+            <a:off x="629842" y="2505075"/>
+            <a:ext cx="3868340" cy="3684588"/>
           </a:xfrm>
         </p:spPr>
         <p:txBody>
@@ -1665,19 +1557,13 @@
               <a:rPr lang="en-GB"/>
               <a:t>Fifth level</a:t>
             </a:r>
-            <a:endParaRPr lang="en-US"/>
-          </a:p>
-        </p:txBody>
-      </p:sp>
-      <p:sp>
-        <p:nvSpPr>
-          <p:cNvPr id="5" name="Text Placeholder 4">
-            <a:extLst>
-              <a:ext uri="{FF2B5EF4-FFF2-40B4-BE49-F238E27FC236}">
-                <a16:creationId xmlns:a16="http://schemas.microsoft.com/office/drawing/2014/main" id="{A79EC028-8C7E-8549-A4C3-1D8BA9FF84AD}"/>
-              </a:ext>
-            </a:extLst>
-          </p:cNvPr>
+            <a:endParaRPr lang="en-US" dirty="0"/>
+          </a:p>
+        </p:txBody>
+      </p:sp>
+      <p:sp>
+        <p:nvSpPr>
+          <p:cNvPr id="5" name="Text Placeholder 4"/>
           <p:cNvSpPr>
             <a:spLocks noGrp="1"/>
           </p:cNvSpPr>
@@ -1687,8 +1573,8 @@
         </p:nvSpPr>
         <p:spPr>
           <a:xfrm>
-            <a:off x="6172200" y="1681163"/>
-            <a:ext cx="5183188" cy="823912"/>
+            <a:off x="4629150" y="1681163"/>
+            <a:ext cx="3887391" cy="823912"/>
           </a:xfrm>
         </p:spPr>
         <p:txBody>
@@ -1742,13 +1628,7 @@
       </p:sp>
       <p:sp>
         <p:nvSpPr>
-          <p:cNvPr id="6" name="Content Placeholder 5">
-            <a:extLst>
-              <a:ext uri="{FF2B5EF4-FFF2-40B4-BE49-F238E27FC236}">
-                <a16:creationId xmlns:a16="http://schemas.microsoft.com/office/drawing/2014/main" id="{8CFAA84D-44E3-4146-8D51-1BBC43B9B4B6}"/>
-              </a:ext>
-            </a:extLst>
-          </p:cNvPr>
+          <p:cNvPr id="6" name="Content Placeholder 5"/>
           <p:cNvSpPr>
             <a:spLocks noGrp="1"/>
           </p:cNvSpPr>
@@ -1758,8 +1638,8 @@
         </p:nvSpPr>
         <p:spPr>
           <a:xfrm>
-            <a:off x="6172200" y="2505075"/>
-            <a:ext cx="5183188" cy="3684588"/>
+            <a:off x="4629150" y="2505075"/>
+            <a:ext cx="3887391" cy="3684588"/>
           </a:xfrm>
         </p:spPr>
         <p:txBody>
@@ -1799,19 +1679,13 @@
               <a:rPr lang="en-GB"/>
               <a:t>Fifth level</a:t>
             </a:r>
-            <a:endParaRPr lang="en-US"/>
-          </a:p>
-        </p:txBody>
-      </p:sp>
-      <p:sp>
-        <p:nvSpPr>
-          <p:cNvPr id="7" name="Date Placeholder 6">
-            <a:extLst>
-              <a:ext uri="{FF2B5EF4-FFF2-40B4-BE49-F238E27FC236}">
-                <a16:creationId xmlns:a16="http://schemas.microsoft.com/office/drawing/2014/main" id="{281B8C98-EB2C-1E4A-B0F8-2B19839F5A87}"/>
-              </a:ext>
-            </a:extLst>
-          </p:cNvPr>
+            <a:endParaRPr lang="en-US" dirty="0"/>
+          </a:p>
+        </p:txBody>
+      </p:sp>
+      <p:sp>
+        <p:nvSpPr>
+          <p:cNvPr id="7" name="Date Placeholder 6"/>
           <p:cNvSpPr>
             <a:spLocks noGrp="1"/>
           </p:cNvSpPr>
@@ -1826,7 +1700,7 @@
           <a:p>
             <a:fld id="{D68DAA29-6983-6346-8A76-F6310C999CFF}" type="datetimeFigureOut">
               <a:rPr lang="en-US" smtClean="0"/>
-              <a:t>2/19/20</a:t>
+              <a:t>2/20/20</a:t>
             </a:fld>
             <a:endParaRPr lang="en-US"/>
           </a:p>
@@ -1834,13 +1708,7 @@
       </p:sp>
       <p:sp>
         <p:nvSpPr>
-          <p:cNvPr id="8" name="Footer Placeholder 7">
-            <a:extLst>
-              <a:ext uri="{FF2B5EF4-FFF2-40B4-BE49-F238E27FC236}">
-                <a16:creationId xmlns:a16="http://schemas.microsoft.com/office/drawing/2014/main" id="{18DC5DD6-4E69-1A4D-B1C1-2364219ED6C8}"/>
-              </a:ext>
-            </a:extLst>
-          </p:cNvPr>
+          <p:cNvPr id="8" name="Footer Placeholder 7"/>
           <p:cNvSpPr>
             <a:spLocks noGrp="1"/>
           </p:cNvSpPr>
@@ -1859,13 +1727,7 @@
       </p:sp>
       <p:sp>
         <p:nvSpPr>
-          <p:cNvPr id="9" name="Slide Number Placeholder 8">
-            <a:extLst>
-              <a:ext uri="{FF2B5EF4-FFF2-40B4-BE49-F238E27FC236}">
-                <a16:creationId xmlns:a16="http://schemas.microsoft.com/office/drawing/2014/main" id="{0AA2D22C-3152-BB43-A823-CEC74C5BB560}"/>
-              </a:ext>
-            </a:extLst>
-          </p:cNvPr>
+          <p:cNvPr id="9" name="Slide Number Placeholder 8"/>
           <p:cNvSpPr>
             <a:spLocks noGrp="1"/>
           </p:cNvSpPr>
@@ -1889,7 +1751,7 @@
     </p:spTree>
     <p:extLst>
       <p:ext uri="{BB962C8B-B14F-4D97-AF65-F5344CB8AC3E}">
-        <p14:creationId xmlns:p14="http://schemas.microsoft.com/office/powerpoint/2010/main" val="1742800607"/>
+        <p14:creationId xmlns:p14="http://schemas.microsoft.com/office/powerpoint/2010/main" val="588678843"/>
       </p:ext>
     </p:extLst>
   </p:cSld>
@@ -1918,13 +1780,7 @@
       </p:grpSpPr>
       <p:sp>
         <p:nvSpPr>
-          <p:cNvPr id="2" name="Title 1">
-            <a:extLst>
-              <a:ext uri="{FF2B5EF4-FFF2-40B4-BE49-F238E27FC236}">
-                <a16:creationId xmlns:a16="http://schemas.microsoft.com/office/drawing/2014/main" id="{66E449E9-6BF7-C041-92CE-605417C4C6FB}"/>
-              </a:ext>
-            </a:extLst>
-          </p:cNvPr>
+          <p:cNvPr id="2" name="Title 1"/>
           <p:cNvSpPr>
             <a:spLocks noGrp="1"/>
           </p:cNvSpPr>
@@ -1941,19 +1797,13 @@
               <a:rPr lang="en-GB"/>
               <a:t>Click to edit Master title style</a:t>
             </a:r>
-            <a:endParaRPr lang="en-US"/>
-          </a:p>
-        </p:txBody>
-      </p:sp>
-      <p:sp>
-        <p:nvSpPr>
-          <p:cNvPr id="3" name="Date Placeholder 2">
-            <a:extLst>
-              <a:ext uri="{FF2B5EF4-FFF2-40B4-BE49-F238E27FC236}">
-                <a16:creationId xmlns:a16="http://schemas.microsoft.com/office/drawing/2014/main" id="{691F0D0E-3FD4-C241-AF57-C9F530E07CB4}"/>
-              </a:ext>
-            </a:extLst>
-          </p:cNvPr>
+            <a:endParaRPr lang="en-US" dirty="0"/>
+          </a:p>
+        </p:txBody>
+      </p:sp>
+      <p:sp>
+        <p:nvSpPr>
+          <p:cNvPr id="3" name="Date Placeholder 2"/>
           <p:cNvSpPr>
             <a:spLocks noGrp="1"/>
           </p:cNvSpPr>
@@ -1968,7 +1818,7 @@
           <a:p>
             <a:fld id="{D68DAA29-6983-6346-8A76-F6310C999CFF}" type="datetimeFigureOut">
               <a:rPr lang="en-US" smtClean="0"/>
-              <a:t>2/19/20</a:t>
+              <a:t>2/20/20</a:t>
             </a:fld>
             <a:endParaRPr lang="en-US"/>
           </a:p>
@@ -1976,13 +1826,7 @@
       </p:sp>
       <p:sp>
         <p:nvSpPr>
-          <p:cNvPr id="4" name="Footer Placeholder 3">
-            <a:extLst>
-              <a:ext uri="{FF2B5EF4-FFF2-40B4-BE49-F238E27FC236}">
-                <a16:creationId xmlns:a16="http://schemas.microsoft.com/office/drawing/2014/main" id="{C287E2D2-1AD6-2847-8EA1-A205B9807E2A}"/>
-              </a:ext>
-            </a:extLst>
-          </p:cNvPr>
+          <p:cNvPr id="4" name="Footer Placeholder 3"/>
           <p:cNvSpPr>
             <a:spLocks noGrp="1"/>
           </p:cNvSpPr>
@@ -2001,13 +1845,7 @@
       </p:sp>
       <p:sp>
         <p:nvSpPr>
-          <p:cNvPr id="5" name="Slide Number Placeholder 4">
-            <a:extLst>
-              <a:ext uri="{FF2B5EF4-FFF2-40B4-BE49-F238E27FC236}">
-                <a16:creationId xmlns:a16="http://schemas.microsoft.com/office/drawing/2014/main" id="{EC79B946-C78F-BE41-B0F4-17D8EC840029}"/>
-              </a:ext>
-            </a:extLst>
-          </p:cNvPr>
+          <p:cNvPr id="5" name="Slide Number Placeholder 4"/>
           <p:cNvSpPr>
             <a:spLocks noGrp="1"/>
           </p:cNvSpPr>
@@ -2031,7 +1869,7 @@
     </p:spTree>
     <p:extLst>
       <p:ext uri="{BB962C8B-B14F-4D97-AF65-F5344CB8AC3E}">
-        <p14:creationId xmlns:p14="http://schemas.microsoft.com/office/powerpoint/2010/main" val="2666609260"/>
+        <p14:creationId xmlns:p14="http://schemas.microsoft.com/office/powerpoint/2010/main" val="319550383"/>
       </p:ext>
     </p:extLst>
   </p:cSld>
@@ -2060,13 +1898,7 @@
       </p:grpSpPr>
       <p:sp>
         <p:nvSpPr>
-          <p:cNvPr id="2" name="Date Placeholder 1">
-            <a:extLst>
-              <a:ext uri="{FF2B5EF4-FFF2-40B4-BE49-F238E27FC236}">
-                <a16:creationId xmlns:a16="http://schemas.microsoft.com/office/drawing/2014/main" id="{412316F2-61E4-5B46-A672-C842A2749CCD}"/>
-              </a:ext>
-            </a:extLst>
-          </p:cNvPr>
+          <p:cNvPr id="2" name="Date Placeholder 1"/>
           <p:cNvSpPr>
             <a:spLocks noGrp="1"/>
           </p:cNvSpPr>
@@ -2081,7 +1913,7 @@
           <a:p>
             <a:fld id="{D68DAA29-6983-6346-8A76-F6310C999CFF}" type="datetimeFigureOut">
               <a:rPr lang="en-US" smtClean="0"/>
-              <a:t>2/19/20</a:t>
+              <a:t>2/20/20</a:t>
             </a:fld>
             <a:endParaRPr lang="en-US"/>
           </a:p>
@@ -2089,13 +1921,7 @@
       </p:sp>
       <p:sp>
         <p:nvSpPr>
-          <p:cNvPr id="3" name="Footer Placeholder 2">
-            <a:extLst>
-              <a:ext uri="{FF2B5EF4-FFF2-40B4-BE49-F238E27FC236}">
-                <a16:creationId xmlns:a16="http://schemas.microsoft.com/office/drawing/2014/main" id="{BD993A73-6497-2B4D-A643-8088FBF460A3}"/>
-              </a:ext>
-            </a:extLst>
-          </p:cNvPr>
+          <p:cNvPr id="3" name="Footer Placeholder 2"/>
           <p:cNvSpPr>
             <a:spLocks noGrp="1"/>
           </p:cNvSpPr>
@@ -2114,13 +1940,7 @@
       </p:sp>
       <p:sp>
         <p:nvSpPr>
-          <p:cNvPr id="4" name="Slide Number Placeholder 3">
-            <a:extLst>
-              <a:ext uri="{FF2B5EF4-FFF2-40B4-BE49-F238E27FC236}">
-                <a16:creationId xmlns:a16="http://schemas.microsoft.com/office/drawing/2014/main" id="{3F07F140-CD8E-5641-A5D2-607B9736A33A}"/>
-              </a:ext>
-            </a:extLst>
-          </p:cNvPr>
+          <p:cNvPr id="4" name="Slide Number Placeholder 3"/>
           <p:cNvSpPr>
             <a:spLocks noGrp="1"/>
           </p:cNvSpPr>
@@ -2144,7 +1964,7 @@
     </p:spTree>
     <p:extLst>
       <p:ext uri="{BB962C8B-B14F-4D97-AF65-F5344CB8AC3E}">
-        <p14:creationId xmlns:p14="http://schemas.microsoft.com/office/powerpoint/2010/main" val="582250475"/>
+        <p14:creationId xmlns:p14="http://schemas.microsoft.com/office/powerpoint/2010/main" val="1630684715"/>
       </p:ext>
     </p:extLst>
   </p:cSld>
@@ -2173,13 +1993,7 @@
       </p:grpSpPr>
       <p:sp>
         <p:nvSpPr>
-          <p:cNvPr id="2" name="Title 1">
-            <a:extLst>
-              <a:ext uri="{FF2B5EF4-FFF2-40B4-BE49-F238E27FC236}">
-                <a16:creationId xmlns:a16="http://schemas.microsoft.com/office/drawing/2014/main" id="{20184750-D41F-5C4C-AEBD-B08258195206}"/>
-              </a:ext>
-            </a:extLst>
-          </p:cNvPr>
+          <p:cNvPr id="2" name="Title 1"/>
           <p:cNvSpPr>
             <a:spLocks noGrp="1"/>
           </p:cNvSpPr>
@@ -2189,8 +2003,8 @@
         </p:nvSpPr>
         <p:spPr>
           <a:xfrm>
-            <a:off x="839788" y="457200"/>
-            <a:ext cx="3932237" cy="1600200"/>
+            <a:off x="629841" y="457200"/>
+            <a:ext cx="2949178" cy="1600200"/>
           </a:xfrm>
         </p:spPr>
         <p:txBody>
@@ -2205,19 +2019,13 @@
               <a:rPr lang="en-GB"/>
               <a:t>Click to edit Master title style</a:t>
             </a:r>
-            <a:endParaRPr lang="en-US"/>
-          </a:p>
-        </p:txBody>
-      </p:sp>
-      <p:sp>
-        <p:nvSpPr>
-          <p:cNvPr id="3" name="Content Placeholder 2">
-            <a:extLst>
-              <a:ext uri="{FF2B5EF4-FFF2-40B4-BE49-F238E27FC236}">
-                <a16:creationId xmlns:a16="http://schemas.microsoft.com/office/drawing/2014/main" id="{8F267444-92BB-3A4E-A2E6-41474B73FDD7}"/>
-              </a:ext>
-            </a:extLst>
-          </p:cNvPr>
+            <a:endParaRPr lang="en-US" dirty="0"/>
+          </a:p>
+        </p:txBody>
+      </p:sp>
+      <p:sp>
+        <p:nvSpPr>
+          <p:cNvPr id="3" name="Content Placeholder 2"/>
           <p:cNvSpPr>
             <a:spLocks noGrp="1"/>
           </p:cNvSpPr>
@@ -2227,8 +2035,8 @@
         </p:nvSpPr>
         <p:spPr>
           <a:xfrm>
-            <a:off x="5183188" y="987425"/>
-            <a:ext cx="6172200" cy="4873625"/>
+            <a:off x="3887391" y="987426"/>
+            <a:ext cx="4629150" cy="4873625"/>
           </a:xfrm>
         </p:spPr>
         <p:txBody>
@@ -2296,19 +2104,13 @@
               <a:rPr lang="en-GB"/>
               <a:t>Fifth level</a:t>
             </a:r>
-            <a:endParaRPr lang="en-US"/>
-          </a:p>
-        </p:txBody>
-      </p:sp>
-      <p:sp>
-        <p:nvSpPr>
-          <p:cNvPr id="4" name="Text Placeholder 3">
-            <a:extLst>
-              <a:ext uri="{FF2B5EF4-FFF2-40B4-BE49-F238E27FC236}">
-                <a16:creationId xmlns:a16="http://schemas.microsoft.com/office/drawing/2014/main" id="{F36F10E7-B2C4-0A46-A786-DE780DADCE9D}"/>
-              </a:ext>
-            </a:extLst>
-          </p:cNvPr>
+            <a:endParaRPr lang="en-US" dirty="0"/>
+          </a:p>
+        </p:txBody>
+      </p:sp>
+      <p:sp>
+        <p:nvSpPr>
+          <p:cNvPr id="4" name="Text Placeholder 3"/>
           <p:cNvSpPr>
             <a:spLocks noGrp="1"/>
           </p:cNvSpPr>
@@ -2318,8 +2120,8 @@
         </p:nvSpPr>
         <p:spPr>
           <a:xfrm>
-            <a:off x="839788" y="2057400"/>
-            <a:ext cx="3932237" cy="3811588"/>
+            <a:off x="629841" y="2057400"/>
+            <a:ext cx="2949178" cy="3811588"/>
           </a:xfrm>
         </p:spPr>
         <p:txBody>
@@ -2373,13 +2175,7 @@
       </p:sp>
       <p:sp>
         <p:nvSpPr>
-          <p:cNvPr id="5" name="Date Placeholder 4">
-            <a:extLst>
-              <a:ext uri="{FF2B5EF4-FFF2-40B4-BE49-F238E27FC236}">
-                <a16:creationId xmlns:a16="http://schemas.microsoft.com/office/drawing/2014/main" id="{DDF39942-BCC0-C440-96AA-C27F04C6CCD1}"/>
-              </a:ext>
-            </a:extLst>
-          </p:cNvPr>
+          <p:cNvPr id="5" name="Date Placeholder 4"/>
           <p:cNvSpPr>
             <a:spLocks noGrp="1"/>
           </p:cNvSpPr>
@@ -2394,7 +2190,7 @@
           <a:p>
             <a:fld id="{D68DAA29-6983-6346-8A76-F6310C999CFF}" type="datetimeFigureOut">
               <a:rPr lang="en-US" smtClean="0"/>
-              <a:t>2/19/20</a:t>
+              <a:t>2/20/20</a:t>
             </a:fld>
             <a:endParaRPr lang="en-US"/>
           </a:p>
@@ -2402,13 +2198,7 @@
       </p:sp>
       <p:sp>
         <p:nvSpPr>
-          <p:cNvPr id="6" name="Footer Placeholder 5">
-            <a:extLst>
-              <a:ext uri="{FF2B5EF4-FFF2-40B4-BE49-F238E27FC236}">
-                <a16:creationId xmlns:a16="http://schemas.microsoft.com/office/drawing/2014/main" id="{972734E0-281F-8F40-8CF7-45700ED2C535}"/>
-              </a:ext>
-            </a:extLst>
-          </p:cNvPr>
+          <p:cNvPr id="6" name="Footer Placeholder 5"/>
           <p:cNvSpPr>
             <a:spLocks noGrp="1"/>
           </p:cNvSpPr>
@@ -2427,13 +2217,7 @@
       </p:sp>
       <p:sp>
         <p:nvSpPr>
-          <p:cNvPr id="7" name="Slide Number Placeholder 6">
-            <a:extLst>
-              <a:ext uri="{FF2B5EF4-FFF2-40B4-BE49-F238E27FC236}">
-                <a16:creationId xmlns:a16="http://schemas.microsoft.com/office/drawing/2014/main" id="{AB0E65AA-1553-2F4F-806C-2FD21A631E55}"/>
-              </a:ext>
-            </a:extLst>
-          </p:cNvPr>
+          <p:cNvPr id="7" name="Slide Number Placeholder 6"/>
           <p:cNvSpPr>
             <a:spLocks noGrp="1"/>
           </p:cNvSpPr>
@@ -2457,7 +2241,7 @@
     </p:spTree>
     <p:extLst>
       <p:ext uri="{BB962C8B-B14F-4D97-AF65-F5344CB8AC3E}">
-        <p14:creationId xmlns:p14="http://schemas.microsoft.com/office/powerpoint/2010/main" val="4277479349"/>
+        <p14:creationId xmlns:p14="http://schemas.microsoft.com/office/powerpoint/2010/main" val="3959212823"/>
       </p:ext>
     </p:extLst>
   </p:cSld>
@@ -2486,13 +2270,7 @@
       </p:grpSpPr>
       <p:sp>
         <p:nvSpPr>
-          <p:cNvPr id="2" name="Title 1">
-            <a:extLst>
-              <a:ext uri="{FF2B5EF4-FFF2-40B4-BE49-F238E27FC236}">
-                <a16:creationId xmlns:a16="http://schemas.microsoft.com/office/drawing/2014/main" id="{EA01033F-8DCE-5045-8A72-3B4F2A513D9B}"/>
-              </a:ext>
-            </a:extLst>
-          </p:cNvPr>
+          <p:cNvPr id="2" name="Title 1"/>
           <p:cNvSpPr>
             <a:spLocks noGrp="1"/>
           </p:cNvSpPr>
@@ -2502,8 +2280,8 @@
         </p:nvSpPr>
         <p:spPr>
           <a:xfrm>
-            <a:off x="839788" y="457200"/>
-            <a:ext cx="3932237" cy="1600200"/>
+            <a:off x="629841" y="457200"/>
+            <a:ext cx="2949178" cy="1600200"/>
           </a:xfrm>
         </p:spPr>
         <p:txBody>
@@ -2518,21 +2296,15 @@
               <a:rPr lang="en-GB"/>
               <a:t>Click to edit Master title style</a:t>
             </a:r>
-            <a:endParaRPr lang="en-US"/>
-          </a:p>
-        </p:txBody>
-      </p:sp>
-      <p:sp>
-        <p:nvSpPr>
-          <p:cNvPr id="3" name="Picture Placeholder 2">
-            <a:extLst>
-              <a:ext uri="{FF2B5EF4-FFF2-40B4-BE49-F238E27FC236}">
-                <a16:creationId xmlns:a16="http://schemas.microsoft.com/office/drawing/2014/main" id="{86C7940D-6224-B04A-BBCC-56D881210619}"/>
-              </a:ext>
-            </a:extLst>
-          </p:cNvPr>
-          <p:cNvSpPr>
-            <a:spLocks noGrp="1"/>
+            <a:endParaRPr lang="en-US" dirty="0"/>
+          </a:p>
+        </p:txBody>
+      </p:sp>
+      <p:sp>
+        <p:nvSpPr>
+          <p:cNvPr id="3" name="Picture Placeholder 2"/>
+          <p:cNvSpPr>
+            <a:spLocks noGrp="1" noChangeAspect="1"/>
           </p:cNvSpPr>
           <p:nvPr>
             <p:ph type="pic" idx="1"/>
@@ -2540,8 +2312,73 @@
         </p:nvSpPr>
         <p:spPr>
           <a:xfrm>
-            <a:off x="5183188" y="987425"/>
-            <a:ext cx="6172200" cy="4873625"/>
+            <a:off x="3887391" y="987426"/>
+            <a:ext cx="4629150" cy="4873625"/>
+          </a:xfrm>
+        </p:spPr>
+        <p:txBody>
+          <a:bodyPr anchor="t"/>
+          <a:lstStyle>
+            <a:lvl1pPr marL="0" indent="0">
+              <a:buNone/>
+              <a:defRPr sz="3200"/>
+            </a:lvl1pPr>
+            <a:lvl2pPr marL="457200" indent="0">
+              <a:buNone/>
+              <a:defRPr sz="2800"/>
+            </a:lvl2pPr>
+            <a:lvl3pPr marL="914400" indent="0">
+              <a:buNone/>
+              <a:defRPr sz="2400"/>
+            </a:lvl3pPr>
+            <a:lvl4pPr marL="1371600" indent="0">
+              <a:buNone/>
+              <a:defRPr sz="2000"/>
+            </a:lvl4pPr>
+            <a:lvl5pPr marL="1828800" indent="0">
+              <a:buNone/>
+              <a:defRPr sz="2000"/>
+            </a:lvl5pPr>
+            <a:lvl6pPr marL="2286000" indent="0">
+              <a:buNone/>
+              <a:defRPr sz="2000"/>
+            </a:lvl6pPr>
+            <a:lvl7pPr marL="2743200" indent="0">
+              <a:buNone/>
+              <a:defRPr sz="2000"/>
+            </a:lvl7pPr>
+            <a:lvl8pPr marL="3200400" indent="0">
+              <a:buNone/>
+              <a:defRPr sz="2000"/>
+            </a:lvl8pPr>
+            <a:lvl9pPr marL="3657600" indent="0">
+              <a:buNone/>
+              <a:defRPr sz="2000"/>
+            </a:lvl9pPr>
+          </a:lstStyle>
+          <a:p>
+            <a:r>
+              <a:rPr lang="en-GB"/>
+              <a:t>Click icon to add picture</a:t>
+            </a:r>
+            <a:endParaRPr lang="en-US" dirty="0"/>
+          </a:p>
+        </p:txBody>
+      </p:sp>
+      <p:sp>
+        <p:nvSpPr>
+          <p:cNvPr id="4" name="Text Placeholder 3"/>
+          <p:cNvSpPr>
+            <a:spLocks noGrp="1"/>
+          </p:cNvSpPr>
+          <p:nvPr>
+            <p:ph type="body" sz="half" idx="2"/>
+          </p:nvPr>
+        </p:nvSpPr>
+        <p:spPr>
+          <a:xfrm>
+            <a:off x="629841" y="2057400"/>
+            <a:ext cx="2949178" cy="3811588"/>
           </a:xfrm>
         </p:spPr>
         <p:txBody>
@@ -2549,73 +2386,6 @@
           <a:lstStyle>
             <a:lvl1pPr marL="0" indent="0">
               <a:buNone/>
-              <a:defRPr sz="3200"/>
-            </a:lvl1pPr>
-            <a:lvl2pPr marL="457200" indent="0">
-              <a:buNone/>
-              <a:defRPr sz="2800"/>
-            </a:lvl2pPr>
-            <a:lvl3pPr marL="914400" indent="0">
-              <a:buNone/>
-              <a:defRPr sz="2400"/>
-            </a:lvl3pPr>
-            <a:lvl4pPr marL="1371600" indent="0">
-              <a:buNone/>
-              <a:defRPr sz="2000"/>
-            </a:lvl4pPr>
-            <a:lvl5pPr marL="1828800" indent="0">
-              <a:buNone/>
-              <a:defRPr sz="2000"/>
-            </a:lvl5pPr>
-            <a:lvl6pPr marL="2286000" indent="0">
-              <a:buNone/>
-              <a:defRPr sz="2000"/>
-            </a:lvl6pPr>
-            <a:lvl7pPr marL="2743200" indent="0">
-              <a:buNone/>
-              <a:defRPr sz="2000"/>
-            </a:lvl7pPr>
-            <a:lvl8pPr marL="3200400" indent="0">
-              <a:buNone/>
-              <a:defRPr sz="2000"/>
-            </a:lvl8pPr>
-            <a:lvl9pPr marL="3657600" indent="0">
-              <a:buNone/>
-              <a:defRPr sz="2000"/>
-            </a:lvl9pPr>
-          </a:lstStyle>
-          <a:p>
-            <a:endParaRPr lang="en-US"/>
-          </a:p>
-        </p:txBody>
-      </p:sp>
-      <p:sp>
-        <p:nvSpPr>
-          <p:cNvPr id="4" name="Text Placeholder 3">
-            <a:extLst>
-              <a:ext uri="{FF2B5EF4-FFF2-40B4-BE49-F238E27FC236}">
-                <a16:creationId xmlns:a16="http://schemas.microsoft.com/office/drawing/2014/main" id="{27C8DDC7-9615-AB49-9FAC-86588541899E}"/>
-              </a:ext>
-            </a:extLst>
-          </p:cNvPr>
-          <p:cNvSpPr>
-            <a:spLocks noGrp="1"/>
-          </p:cNvSpPr>
-          <p:nvPr>
-            <p:ph type="body" sz="half" idx="2"/>
-          </p:nvPr>
-        </p:nvSpPr>
-        <p:spPr>
-          <a:xfrm>
-            <a:off x="839788" y="2057400"/>
-            <a:ext cx="3932237" cy="3811588"/>
-          </a:xfrm>
-        </p:spPr>
-        <p:txBody>
-          <a:bodyPr/>
-          <a:lstStyle>
-            <a:lvl1pPr marL="0" indent="0">
-              <a:buNone/>
               <a:defRPr sz="1600"/>
             </a:lvl1pPr>
             <a:lvl2pPr marL="457200" indent="0">
@@ -2662,13 +2432,7 @@
       </p:sp>
       <p:sp>
         <p:nvSpPr>
-          <p:cNvPr id="5" name="Date Placeholder 4">
-            <a:extLst>
-              <a:ext uri="{FF2B5EF4-FFF2-40B4-BE49-F238E27FC236}">
-                <a16:creationId xmlns:a16="http://schemas.microsoft.com/office/drawing/2014/main" id="{3B034A76-5ACC-DF4D-9831-5EEE3D76E161}"/>
-              </a:ext>
-            </a:extLst>
-          </p:cNvPr>
+          <p:cNvPr id="5" name="Date Placeholder 4"/>
           <p:cNvSpPr>
             <a:spLocks noGrp="1"/>
           </p:cNvSpPr>
@@ -2683,7 +2447,7 @@
           <a:p>
             <a:fld id="{D68DAA29-6983-6346-8A76-F6310C999CFF}" type="datetimeFigureOut">
               <a:rPr lang="en-US" smtClean="0"/>
-              <a:t>2/19/20</a:t>
+              <a:t>2/20/20</a:t>
             </a:fld>
             <a:endParaRPr lang="en-US"/>
           </a:p>
@@ -2691,13 +2455,7 @@
       </p:sp>
       <p:sp>
         <p:nvSpPr>
-          <p:cNvPr id="6" name="Footer Placeholder 5">
-            <a:extLst>
-              <a:ext uri="{FF2B5EF4-FFF2-40B4-BE49-F238E27FC236}">
-                <a16:creationId xmlns:a16="http://schemas.microsoft.com/office/drawing/2014/main" id="{E1381DFD-CE87-1740-818F-9BA5BA3DB71E}"/>
-              </a:ext>
-            </a:extLst>
-          </p:cNvPr>
+          <p:cNvPr id="6" name="Footer Placeholder 5"/>
           <p:cNvSpPr>
             <a:spLocks noGrp="1"/>
           </p:cNvSpPr>
@@ -2716,13 +2474,7 @@
       </p:sp>
       <p:sp>
         <p:nvSpPr>
-          <p:cNvPr id="7" name="Slide Number Placeholder 6">
-            <a:extLst>
-              <a:ext uri="{FF2B5EF4-FFF2-40B4-BE49-F238E27FC236}">
-                <a16:creationId xmlns:a16="http://schemas.microsoft.com/office/drawing/2014/main" id="{64D0EFDC-2478-A343-AD16-7B82EFA7AF70}"/>
-              </a:ext>
-            </a:extLst>
-          </p:cNvPr>
+          <p:cNvPr id="7" name="Slide Number Placeholder 6"/>
           <p:cNvSpPr>
             <a:spLocks noGrp="1"/>
           </p:cNvSpPr>
@@ -2746,7 +2498,7 @@
     </p:spTree>
     <p:extLst>
       <p:ext uri="{BB962C8B-B14F-4D97-AF65-F5344CB8AC3E}">
-        <p14:creationId xmlns:p14="http://schemas.microsoft.com/office/powerpoint/2010/main" val="2131711959"/>
+        <p14:creationId xmlns:p14="http://schemas.microsoft.com/office/powerpoint/2010/main" val="587350713"/>
       </p:ext>
     </p:extLst>
   </p:cSld>
@@ -2780,13 +2532,7 @@
       </p:grpSpPr>
       <p:sp>
         <p:nvSpPr>
-          <p:cNvPr id="2" name="Title Placeholder 1">
-            <a:extLst>
-              <a:ext uri="{FF2B5EF4-FFF2-40B4-BE49-F238E27FC236}">
-                <a16:creationId xmlns:a16="http://schemas.microsoft.com/office/drawing/2014/main" id="{DF890C5D-610E-3842-9D8A-A4108C2B73E6}"/>
-              </a:ext>
-            </a:extLst>
-          </p:cNvPr>
+          <p:cNvPr id="2" name="Title Placeholder 1"/>
           <p:cNvSpPr>
             <a:spLocks noGrp="1"/>
           </p:cNvSpPr>
@@ -2796,8 +2542,8 @@
         </p:nvSpPr>
         <p:spPr>
           <a:xfrm>
-            <a:off x="838200" y="365125"/>
-            <a:ext cx="10515600" cy="1325563"/>
+            <a:off x="628650" y="365126"/>
+            <a:ext cx="7886700" cy="1325563"/>
           </a:xfrm>
           <a:prstGeom prst="rect">
             <a:avLst/>
@@ -2813,19 +2559,13 @@
               <a:rPr lang="en-GB"/>
               <a:t>Click to edit Master title style</a:t>
             </a:r>
-            <a:endParaRPr lang="en-US"/>
-          </a:p>
-        </p:txBody>
-      </p:sp>
-      <p:sp>
-        <p:nvSpPr>
-          <p:cNvPr id="3" name="Text Placeholder 2">
-            <a:extLst>
-              <a:ext uri="{FF2B5EF4-FFF2-40B4-BE49-F238E27FC236}">
-                <a16:creationId xmlns:a16="http://schemas.microsoft.com/office/drawing/2014/main" id="{4C4C3261-1D25-D544-87ED-5EEE216DF4E2}"/>
-              </a:ext>
-            </a:extLst>
-          </p:cNvPr>
+            <a:endParaRPr lang="en-US" dirty="0"/>
+          </a:p>
+        </p:txBody>
+      </p:sp>
+      <p:sp>
+        <p:nvSpPr>
+          <p:cNvPr id="3" name="Text Placeholder 2"/>
           <p:cNvSpPr>
             <a:spLocks noGrp="1"/>
           </p:cNvSpPr>
@@ -2835,8 +2575,8 @@
         </p:nvSpPr>
         <p:spPr>
           <a:xfrm>
-            <a:off x="838200" y="1825625"/>
-            <a:ext cx="10515600" cy="4351338"/>
+            <a:off x="628650" y="1825625"/>
+            <a:ext cx="7886700" cy="4351338"/>
           </a:xfrm>
           <a:prstGeom prst="rect">
             <a:avLst/>
@@ -2881,19 +2621,13 @@
               <a:rPr lang="en-GB"/>
               <a:t>Fifth level</a:t>
             </a:r>
-            <a:endParaRPr lang="en-US"/>
-          </a:p>
-        </p:txBody>
-      </p:sp>
-      <p:sp>
-        <p:nvSpPr>
-          <p:cNvPr id="4" name="Date Placeholder 3">
-            <a:extLst>
-              <a:ext uri="{FF2B5EF4-FFF2-40B4-BE49-F238E27FC236}">
-                <a16:creationId xmlns:a16="http://schemas.microsoft.com/office/drawing/2014/main" id="{3BCAFC77-77D9-2E47-84F6-05F7AC705FD6}"/>
-              </a:ext>
-            </a:extLst>
-          </p:cNvPr>
+            <a:endParaRPr lang="en-US" dirty="0"/>
+          </a:p>
+        </p:txBody>
+      </p:sp>
+      <p:sp>
+        <p:nvSpPr>
+          <p:cNvPr id="4" name="Date Placeholder 3"/>
           <p:cNvSpPr>
             <a:spLocks noGrp="1"/>
           </p:cNvSpPr>
@@ -2903,8 +2637,8 @@
         </p:nvSpPr>
         <p:spPr>
           <a:xfrm>
-            <a:off x="838200" y="6356350"/>
-            <a:ext cx="2743200" cy="365125"/>
+            <a:off x="628650" y="6356351"/>
+            <a:ext cx="2057400" cy="365125"/>
           </a:xfrm>
           <a:prstGeom prst="rect">
             <a:avLst/>
@@ -2926,7 +2660,7 @@
           <a:p>
             <a:fld id="{D68DAA29-6983-6346-8A76-F6310C999CFF}" type="datetimeFigureOut">
               <a:rPr lang="en-US" smtClean="0"/>
-              <a:t>2/19/20</a:t>
+              <a:t>2/20/20</a:t>
             </a:fld>
             <a:endParaRPr lang="en-US"/>
           </a:p>
@@ -2934,13 +2668,7 @@
       </p:sp>
       <p:sp>
         <p:nvSpPr>
-          <p:cNvPr id="5" name="Footer Placeholder 4">
-            <a:extLst>
-              <a:ext uri="{FF2B5EF4-FFF2-40B4-BE49-F238E27FC236}">
-                <a16:creationId xmlns:a16="http://schemas.microsoft.com/office/drawing/2014/main" id="{762DB5EB-8398-5340-8AC6-0E258FBF5CB4}"/>
-              </a:ext>
-            </a:extLst>
-          </p:cNvPr>
+          <p:cNvPr id="5" name="Footer Placeholder 4"/>
           <p:cNvSpPr>
             <a:spLocks noGrp="1"/>
           </p:cNvSpPr>
@@ -2950,8 +2678,8 @@
         </p:nvSpPr>
         <p:spPr>
           <a:xfrm>
-            <a:off x="4038600" y="6356350"/>
-            <a:ext cx="4114800" cy="365125"/>
+            <a:off x="3028950" y="6356351"/>
+            <a:ext cx="3086100" cy="365125"/>
           </a:xfrm>
           <a:prstGeom prst="rect">
             <a:avLst/>
@@ -2977,13 +2705,7 @@
       </p:sp>
       <p:sp>
         <p:nvSpPr>
-          <p:cNvPr id="6" name="Slide Number Placeholder 5">
-            <a:extLst>
-              <a:ext uri="{FF2B5EF4-FFF2-40B4-BE49-F238E27FC236}">
-                <a16:creationId xmlns:a16="http://schemas.microsoft.com/office/drawing/2014/main" id="{7594D8C2-52F5-5C4E-AA9E-B33942610469}"/>
-              </a:ext>
-            </a:extLst>
-          </p:cNvPr>
+          <p:cNvPr id="6" name="Slide Number Placeholder 5"/>
           <p:cNvSpPr>
             <a:spLocks noGrp="1"/>
           </p:cNvSpPr>
@@ -2993,8 +2715,8 @@
         </p:nvSpPr>
         <p:spPr>
           <a:xfrm>
-            <a:off x="8610600" y="6356350"/>
-            <a:ext cx="2743200" cy="365125"/>
+            <a:off x="6457950" y="6356351"/>
+            <a:ext cx="2057400" cy="365125"/>
           </a:xfrm>
           <a:prstGeom prst="rect">
             <a:avLst/>
@@ -3025,23 +2747,24 @@
     </p:spTree>
     <p:extLst>
       <p:ext uri="{BB962C8B-B14F-4D97-AF65-F5344CB8AC3E}">
-        <p14:creationId xmlns:p14="http://schemas.microsoft.com/office/powerpoint/2010/main" val="2162077084"/>
+        <p14:creationId xmlns:p14="http://schemas.microsoft.com/office/powerpoint/2010/main" val="3143833964"/>
       </p:ext>
     </p:extLst>
   </p:cSld>
   <p:clrMap bg1="lt1" tx1="dk1" bg2="lt2" tx2="dk2" accent1="accent1" accent2="accent2" accent3="accent3" accent4="accent4" accent5="accent5" accent6="accent6" hlink="hlink" folHlink="folHlink"/>
   <p:sldLayoutIdLst>
-    <p:sldLayoutId id="2147483649" r:id="rId1"/>
-    <p:sldLayoutId id="2147483650" r:id="rId2"/>
-    <p:sldLayoutId id="2147483651" r:id="rId3"/>
-    <p:sldLayoutId id="2147483652" r:id="rId4"/>
-    <p:sldLayoutId id="2147483653" r:id="rId5"/>
-    <p:sldLayoutId id="2147483654" r:id="rId6"/>
-    <p:sldLayoutId id="2147483655" r:id="rId7"/>
-    <p:sldLayoutId id="2147483656" r:id="rId8"/>
-    <p:sldLayoutId id="2147483657" r:id="rId9"/>
-    <p:sldLayoutId id="2147483658" r:id="rId10"/>
-    <p:sldLayoutId id="2147483659" r:id="rId11"/>
+    <p:sldLayoutId id="2147483661" r:id="rId1"/>
+    <p:sldLayoutId id="2147483662" r:id="rId2"/>
+    <p:sldLayoutId id="2147483663" r:id="rId3"/>
+    <p:sldLayoutId id="2147483664" r:id="rId4"/>
+    <p:sldLayoutId id="2147483665" r:id="rId5"/>
+    <p:sldLayoutId id="2147483666" r:id="rId6"/>
+    <p:sldLayoutId id="2147483667" r:id="rId7"/>
+    <p:sldLayoutId id="2147483668" r:id="rId8"/>
+    <p:sldLayoutId id="2147483669" r:id="rId9"/>
+    <p:sldLayoutId id="2147483670" r:id="rId10"/>
+    <p:sldLayoutId id="2147483671" r:id="rId11"/>
+    <p:sldLayoutId id="2147483672" r:id="rId12"/>
   </p:sldLayoutIdLst>
   <p:txStyles>
     <p:titleStyle>
@@ -3345,80 +3068,311 @@
       </p:grpSpPr>
       <p:pic>
         <p:nvPicPr>
-          <p:cNvPr id="4" name="Picture 3" descr="A screenshot of a cell phone&#10;&#10;Description automatically generated">
-            <a:extLst>
-              <a:ext uri="{FF2B5EF4-FFF2-40B4-BE49-F238E27FC236}">
-                <a16:creationId xmlns:a16="http://schemas.microsoft.com/office/drawing/2014/main" id="{968FB5B3-0785-084B-BFD0-BA56197C26ED}"/>
-              </a:ext>
-            </a:extLst>
-          </p:cNvPr>
-          <p:cNvPicPr>
-            <a:picLocks noChangeAspect="1"/>
-          </p:cNvPicPr>
+          <p:cNvPr id="38" name="Google Shape;88;p13"/>
+          <p:cNvPicPr/>
           <p:nvPr/>
         </p:nvPicPr>
-        <p:blipFill rotWithShape="1">
-          <a:blip r:embed="rId2" cstate="print">
-            <a:extLst>
-              <a:ext uri="{28A0092B-C50C-407E-A947-70E740481C1C}">
-                <a14:useLocalDpi xmlns:a14="http://schemas.microsoft.com/office/drawing/2010/main" val="0"/>
-              </a:ext>
-            </a:extLst>
-          </a:blip>
-          <a:srcRect r="9510"/>
+        <p:blipFill>
+          <a:blip r:embed="rId2"/>
+          <a:srcRect t="29433"/>
           <a:stretch/>
         </p:blipFill>
         <p:spPr>
           <a:xfrm>
-            <a:off x="218414" y="616404"/>
-            <a:ext cx="11973586" cy="4410201"/>
+            <a:off x="0" y="3764880"/>
+            <a:ext cx="9143280" cy="3092400"/>
           </a:xfrm>
           <a:prstGeom prst="rect">
             <a:avLst/>
           </a:prstGeom>
+          <a:ln>
+            <a:noFill/>
+          </a:ln>
         </p:spPr>
       </p:pic>
-      <p:pic>
-        <p:nvPicPr>
-          <p:cNvPr id="5" name="Picture 4" descr="A screenshot of a cell phone&#10;&#10;Description automatically generated">
-            <a:extLst>
-              <a:ext uri="{FF2B5EF4-FFF2-40B4-BE49-F238E27FC236}">
-                <a16:creationId xmlns:a16="http://schemas.microsoft.com/office/drawing/2014/main" id="{73CD5C65-883D-764E-9077-91C9D2A7A5CA}"/>
-              </a:ext>
-            </a:extLst>
-          </p:cNvPr>
-          <p:cNvPicPr>
-            <a:picLocks noChangeAspect="1"/>
-          </p:cNvPicPr>
+      <p:sp>
+        <p:nvSpPr>
+          <p:cNvPr id="39" name="CustomShape 1"/>
+          <p:cNvSpPr/>
           <p:nvPr/>
-        </p:nvPicPr>
-        <p:blipFill rotWithShape="1">
-          <a:blip r:embed="rId2" cstate="print">
-            <a:extLst>
-              <a:ext uri="{28A0092B-C50C-407E-A947-70E740481C1C}">
-                <a14:useLocalDpi xmlns:a14="http://schemas.microsoft.com/office/drawing/2010/main" val="0"/>
-              </a:ext>
-            </a:extLst>
-          </a:blip>
-          <a:srcRect l="89728" t="27513" b="54406"/>
-          <a:stretch/>
-        </p:blipFill>
-        <p:spPr>
-          <a:xfrm>
-            <a:off x="218414" y="5624185"/>
-            <a:ext cx="1745280" cy="1023855"/>
+        </p:nvSpPr>
+        <p:spPr>
+          <a:xfrm>
+            <a:off x="200721" y="371387"/>
+            <a:ext cx="8828079" cy="2116440"/>
           </a:xfrm>
           <a:prstGeom prst="rect">
             <a:avLst/>
           </a:prstGeom>
-        </p:spPr>
-      </p:pic>
-      <p:sp>
-        <p:nvSpPr>
-          <p:cNvPr id="7" name="Rectangle 6">
+          <a:noFill/>
+          <a:ln>
+            <a:noFill/>
+          </a:ln>
+        </p:spPr>
+        <p:style>
+          <a:lnRef idx="0">
+            <a:scrgbClr r="0" g="0" b="0"/>
+          </a:lnRef>
+          <a:fillRef idx="0">
+            <a:scrgbClr r="0" g="0" b="0"/>
+          </a:fillRef>
+          <a:effectRef idx="0">
+            <a:scrgbClr r="0" g="0" b="0"/>
+          </a:effectRef>
+          <a:fontRef idx="minor"/>
+        </p:style>
+        <p:txBody>
+          <a:bodyPr lIns="68400" tIns="34200" rIns="68400" bIns="34200" anchor="ctr"/>
+          <a:lstStyle/>
+          <a:p>
+            <a:r>
+              <a:rPr lang="en-GB" sz="2400" b="1" spc="-1" dirty="0">
+                <a:solidFill>
+                  <a:srgbClr val="000000"/>
+                </a:solidFill>
+                <a:latin typeface="Avenir"/>
+                <a:ea typeface="Avenir"/>
+              </a:rPr>
+              <a:t>Similar axes of</a:t>
+            </a:r>
+          </a:p>
+          <a:p>
+            <a:r>
+              <a:rPr lang="en-GB" sz="4000" b="1" spc="-1" dirty="0">
+                <a:solidFill>
+                  <a:srgbClr val="000000"/>
+                </a:solidFill>
+                <a:latin typeface="Avenir"/>
+                <a:ea typeface="Avenir"/>
+              </a:rPr>
+              <a:t>environmental heterogeneity </a:t>
+            </a:r>
+            <a:r>
+              <a:rPr lang="en-GB" sz="2400" b="1" spc="-1" dirty="0">
+                <a:solidFill>
+                  <a:srgbClr val="000000"/>
+                </a:solidFill>
+                <a:latin typeface="Avenir"/>
+                <a:ea typeface="Avenir"/>
+              </a:rPr>
+              <a:t>associate with</a:t>
+            </a:r>
+          </a:p>
+          <a:p>
+            <a:r>
+              <a:rPr lang="en-GB" sz="4000" b="1" spc="-1" dirty="0">
+                <a:solidFill>
+                  <a:srgbClr val="000000"/>
+                </a:solidFill>
+                <a:latin typeface="Avenir"/>
+                <a:ea typeface="Avenir"/>
+              </a:rPr>
+              <a:t>plant species richness </a:t>
+            </a:r>
+            <a:r>
+              <a:rPr lang="en-GB" sz="2400" b="1" spc="-1" dirty="0">
+                <a:solidFill>
+                  <a:srgbClr val="000000"/>
+                </a:solidFill>
+                <a:latin typeface="Avenir"/>
+                <a:ea typeface="Avenir"/>
+              </a:rPr>
+              <a:t>in two MTEs</a:t>
+            </a:r>
+            <a:endParaRPr lang="en-GB" sz="4000" b="1" strike="noStrike" spc="-1" dirty="0">
+              <a:latin typeface="Arial"/>
+            </a:endParaRPr>
+          </a:p>
+        </p:txBody>
+      </p:sp>
+      <p:sp>
+        <p:nvSpPr>
+          <p:cNvPr id="40" name="CustomShape 2"/>
+          <p:cNvSpPr/>
+          <p:nvPr/>
+        </p:nvSpPr>
+        <p:spPr>
+          <a:xfrm>
+            <a:off x="2192055" y="4699800"/>
+            <a:ext cx="6836745" cy="948960"/>
+          </a:xfrm>
+          <a:prstGeom prst="rect">
+            <a:avLst/>
+          </a:prstGeom>
+          <a:noFill/>
+          <a:ln>
+            <a:noFill/>
+          </a:ln>
+        </p:spPr>
+        <p:style>
+          <a:lnRef idx="0">
+            <a:scrgbClr r="0" g="0" b="0"/>
+          </a:lnRef>
+          <a:fillRef idx="0">
+            <a:scrgbClr r="0" g="0" b="0"/>
+          </a:fillRef>
+          <a:effectRef idx="0">
+            <a:scrgbClr r="0" g="0" b="0"/>
+          </a:effectRef>
+          <a:fontRef idx="minor"/>
+        </p:style>
+        <p:txBody>
+          <a:bodyPr lIns="68400" tIns="34200" rIns="68400" bIns="34200" anchor="ctr"/>
+          <a:lstStyle/>
+          <a:p>
+            <a:pPr algn="r">
+              <a:lnSpc>
+                <a:spcPct val="100000"/>
+              </a:lnSpc>
+            </a:pPr>
+            <a:r>
+              <a:rPr lang="en-GB" sz="2000" b="1" strike="noStrike" spc="-1" dirty="0">
+                <a:solidFill>
+                  <a:srgbClr val="FFFFFF"/>
+                </a:solidFill>
+                <a:latin typeface="Avenir"/>
+                <a:ea typeface="Avenir"/>
+              </a:rPr>
+              <a:t>Comparing the Greater Cape Floristic Region &amp;</a:t>
+            </a:r>
+            <a:endParaRPr lang="en-GB" sz="2000" b="1" strike="noStrike" spc="-1" dirty="0">
+              <a:latin typeface="Arial"/>
+            </a:endParaRPr>
+          </a:p>
+          <a:p>
+            <a:pPr algn="r">
+              <a:lnSpc>
+                <a:spcPct val="100000"/>
+              </a:lnSpc>
+            </a:pPr>
+            <a:r>
+              <a:rPr lang="en-GB" sz="2000" b="1" strike="noStrike" spc="-1" dirty="0">
+                <a:solidFill>
+                  <a:srgbClr val="FFFFFF"/>
+                </a:solidFill>
+                <a:latin typeface="Avenir"/>
+                <a:ea typeface="Avenir"/>
+              </a:rPr>
+              <a:t>the Southwest Australia Floristic Region</a:t>
+            </a:r>
+            <a:endParaRPr lang="en-GB" sz="2000" b="1" strike="noStrike" spc="-1" dirty="0">
+              <a:latin typeface="Arial"/>
+            </a:endParaRPr>
+          </a:p>
+        </p:txBody>
+      </p:sp>
+      <p:sp>
+        <p:nvSpPr>
+          <p:cNvPr id="47" name="CustomShape 4"/>
+          <p:cNvSpPr/>
+          <p:nvPr/>
+        </p:nvSpPr>
+        <p:spPr>
+          <a:xfrm>
+            <a:off x="3246840" y="6553440"/>
+            <a:ext cx="5896440" cy="303840"/>
+          </a:xfrm>
+          <a:prstGeom prst="rect">
+            <a:avLst/>
+          </a:prstGeom>
+          <a:noFill/>
+          <a:ln>
+            <a:noFill/>
+          </a:ln>
+        </p:spPr>
+        <p:style>
+          <a:lnRef idx="0">
+            <a:scrgbClr r="0" g="0" b="0"/>
+          </a:lnRef>
+          <a:fillRef idx="0">
+            <a:scrgbClr r="0" g="0" b="0"/>
+          </a:fillRef>
+          <a:effectRef idx="0">
+            <a:scrgbClr r="0" g="0" b="0"/>
+          </a:effectRef>
+          <a:fontRef idx="minor"/>
+        </p:style>
+        <p:txBody>
+          <a:bodyPr lIns="68400" tIns="68400" rIns="68400" bIns="68400" anchor="ctr"/>
+          <a:lstStyle/>
+          <a:p>
+            <a:pPr algn="r">
+              <a:lnSpc>
+                <a:spcPct val="100000"/>
+              </a:lnSpc>
+            </a:pPr>
+            <a:r>
+              <a:rPr lang="en-GB" sz="1000" b="1" strike="noStrike" spc="-1" dirty="0" err="1">
+                <a:solidFill>
+                  <a:srgbClr val="FFFFFF"/>
+                </a:solidFill>
+                <a:latin typeface="Avenir"/>
+                <a:ea typeface="Avenir"/>
+              </a:rPr>
+              <a:t>Silvermine</a:t>
+            </a:r>
+            <a:r>
+              <a:rPr lang="en-GB" sz="1000" b="1" strike="noStrike" spc="-1" dirty="0">
+                <a:solidFill>
+                  <a:srgbClr val="FFFFFF"/>
+                </a:solidFill>
+                <a:latin typeface="Avenir"/>
+                <a:ea typeface="Avenir"/>
+              </a:rPr>
+              <a:t>, Table Mountain National Park, South Africa, 2017 © </a:t>
+            </a:r>
+            <a:r>
+              <a:rPr lang="en-GB" sz="1000" b="1" strike="noStrike" spc="-1" dirty="0" err="1">
+                <a:solidFill>
+                  <a:srgbClr val="FFFFFF"/>
+                </a:solidFill>
+                <a:latin typeface="Avenir"/>
+                <a:ea typeface="Avenir"/>
+              </a:rPr>
+              <a:t>Ruan</a:t>
+            </a:r>
+            <a:r>
+              <a:rPr lang="en-GB" sz="1000" b="1" strike="noStrike" spc="-1" dirty="0">
+                <a:solidFill>
+                  <a:srgbClr val="FFFFFF"/>
+                </a:solidFill>
+                <a:latin typeface="Avenir"/>
+                <a:ea typeface="Avenir"/>
+              </a:rPr>
+              <a:t> van </a:t>
+            </a:r>
+            <a:r>
+              <a:rPr lang="en-GB" sz="1000" b="1" strike="noStrike" spc="-1" dirty="0" err="1">
+                <a:solidFill>
+                  <a:srgbClr val="FFFFFF"/>
+                </a:solidFill>
+                <a:latin typeface="Avenir"/>
+                <a:ea typeface="Avenir"/>
+              </a:rPr>
+              <a:t>Mazijk</a:t>
+            </a:r>
+            <a:r>
+              <a:rPr lang="en-GB" sz="1000" b="1" strike="noStrike" spc="-1" dirty="0">
+                <a:solidFill>
+                  <a:srgbClr val="FFFFFF"/>
+                </a:solidFill>
+                <a:latin typeface="Avenir"/>
+                <a:ea typeface="Avenir"/>
+              </a:rPr>
+              <a:t>, Jonathan A. Drake</a:t>
+            </a:r>
+            <a:endParaRPr lang="en-GB" sz="1000" b="1" strike="noStrike" spc="-1" dirty="0">
+              <a:latin typeface="Arial"/>
+            </a:endParaRPr>
+          </a:p>
+        </p:txBody>
+      </p:sp>
+      <p:sp>
+        <p:nvSpPr>
+          <p:cNvPr id="21" name="CustomShape 7">
             <a:extLst>
               <a:ext uri="{FF2B5EF4-FFF2-40B4-BE49-F238E27FC236}">
-                <a16:creationId xmlns:a16="http://schemas.microsoft.com/office/drawing/2014/main" id="{E60E27A5-C6A3-AF4B-9D06-35BB43B2D3A8}"/>
+                <a16:creationId xmlns:a16="http://schemas.microsoft.com/office/drawing/2014/main" id="{877CED18-3BAD-4E4E-B366-2FBB81307BA7}"/>
               </a:ext>
             </a:extLst>
           </p:cNvPr>
@@ -3427,654 +3381,140 @@
         </p:nvSpPr>
         <p:spPr>
           <a:xfrm>
-            <a:off x="803415" y="4655128"/>
-            <a:ext cx="10580914" cy="285008"/>
-          </a:xfrm>
-          <a:prstGeom prst="rect">
-            <a:avLst/>
-          </a:prstGeom>
-          <a:solidFill>
-            <a:srgbClr val="FFFFFF">
-              <a:alpha val="74902"/>
-            </a:srgbClr>
-          </a:solidFill>
-          <a:ln>
-            <a:noFill/>
-          </a:ln>
-        </p:spPr>
-        <p:style>
-          <a:lnRef idx="2">
-            <a:schemeClr val="accent1">
-              <a:shade val="50000"/>
-            </a:schemeClr>
-          </a:lnRef>
-          <a:fillRef idx="1">
-            <a:schemeClr val="accent1"/>
-          </a:fillRef>
-          <a:effectRef idx="0">
-            <a:schemeClr val="accent1"/>
-          </a:effectRef>
-          <a:fontRef idx="minor">
-            <a:schemeClr val="lt1"/>
-          </a:fontRef>
-        </p:style>
-        <p:txBody>
-          <a:bodyPr rtlCol="0" anchor="ctr"/>
-          <a:lstStyle/>
-          <a:p>
-            <a:pPr algn="ctr"/>
-            <a:endParaRPr lang="en-US"/>
-          </a:p>
-        </p:txBody>
-      </p:sp>
-      <p:sp>
-        <p:nvSpPr>
-          <p:cNvPr id="8" name="TextBox 7">
-            <a:extLst>
-              <a:ext uri="{FF2B5EF4-FFF2-40B4-BE49-F238E27FC236}">
-                <a16:creationId xmlns:a16="http://schemas.microsoft.com/office/drawing/2014/main" id="{CBA50735-8652-A846-BBD2-4E1521935E97}"/>
-              </a:ext>
-            </a:extLst>
-          </p:cNvPr>
-          <p:cNvSpPr txBox="1"/>
-          <p:nvPr/>
-        </p:nvSpPr>
-        <p:spPr>
-          <a:xfrm>
-            <a:off x="3822183" y="4940136"/>
-            <a:ext cx="4766048" cy="523220"/>
+            <a:off x="200720" y="2824022"/>
+            <a:ext cx="8828079" cy="948959"/>
           </a:xfrm>
           <a:prstGeom prst="rect">
             <a:avLst/>
           </a:prstGeom>
           <a:noFill/>
-        </p:spPr>
-        <p:txBody>
-          <a:bodyPr wrap="none" rtlCol="0">
-            <a:spAutoFit/>
-          </a:bodyPr>
-          <a:lstStyle/>
-          <a:p>
-            <a:r>
-              <a:rPr lang="en-US" sz="2800" dirty="0">
-                <a:latin typeface="Arial" panose="020B0604020202020204" pitchFamily="34" charset="0"/>
-                <a:cs typeface="Arial" panose="020B0604020202020204" pitchFamily="34" charset="0"/>
-              </a:rPr>
-              <a:t>Environmental heterogeneity</a:t>
-            </a:r>
-          </a:p>
-        </p:txBody>
-      </p:sp>
-      <p:sp>
-        <p:nvSpPr>
-          <p:cNvPr id="9" name="TextBox 8">
-            <a:extLst>
-              <a:ext uri="{FF2B5EF4-FFF2-40B4-BE49-F238E27FC236}">
-                <a16:creationId xmlns:a16="http://schemas.microsoft.com/office/drawing/2014/main" id="{F9C3705F-C19F-AF4F-A3A6-897615DC3760}"/>
-              </a:ext>
-            </a:extLst>
-          </p:cNvPr>
-          <p:cNvSpPr txBox="1"/>
-          <p:nvPr/>
-        </p:nvSpPr>
-        <p:spPr>
-          <a:xfrm rot="16200000">
-            <a:off x="-1190069" y="2518888"/>
-            <a:ext cx="2903359" cy="523220"/>
-          </a:xfrm>
-          <a:prstGeom prst="rect">
-            <a:avLst/>
-          </a:prstGeom>
-          <a:solidFill>
-            <a:schemeClr val="bg1"/>
-          </a:solidFill>
-        </p:spPr>
-        <p:txBody>
-          <a:bodyPr wrap="none" rtlCol="0">
-            <a:spAutoFit/>
-          </a:bodyPr>
-          <a:lstStyle/>
-          <a:p>
-            <a:r>
-              <a:rPr lang="en-US" sz="2800" dirty="0">
-                <a:latin typeface="Arial" panose="020B0604020202020204" pitchFamily="34" charset="0"/>
-                <a:cs typeface="Arial" panose="020B0604020202020204" pitchFamily="34" charset="0"/>
-              </a:rPr>
-              <a:t>Species richness</a:t>
-            </a:r>
-          </a:p>
-        </p:txBody>
-      </p:sp>
-      <p:sp>
-        <p:nvSpPr>
-          <p:cNvPr id="2" name="Rectangle 1">
-            <a:extLst>
-              <a:ext uri="{FF2B5EF4-FFF2-40B4-BE49-F238E27FC236}">
-                <a16:creationId xmlns:a16="http://schemas.microsoft.com/office/drawing/2014/main" id="{7C509218-3BED-6043-93B1-AA96847EE66E}"/>
-              </a:ext>
-            </a:extLst>
-          </p:cNvPr>
-          <p:cNvSpPr/>
-          <p:nvPr/>
-        </p:nvSpPr>
-        <p:spPr>
-          <a:xfrm>
-            <a:off x="890649" y="1338343"/>
-            <a:ext cx="3443845" cy="3013738"/>
-          </a:xfrm>
-          <a:prstGeom prst="rect">
-            <a:avLst/>
-          </a:prstGeom>
-          <a:solidFill>
-            <a:schemeClr val="bg1"/>
-          </a:solidFill>
           <a:ln>
             <a:noFill/>
           </a:ln>
         </p:spPr>
         <p:style>
-          <a:lnRef idx="2">
-            <a:schemeClr val="accent1">
-              <a:shade val="50000"/>
-            </a:schemeClr>
+          <a:lnRef idx="0">
+            <a:scrgbClr r="0" g="0" b="0"/>
           </a:lnRef>
-          <a:fillRef idx="1">
-            <a:schemeClr val="accent1"/>
+          <a:fillRef idx="0">
+            <a:scrgbClr r="0" g="0" b="0"/>
           </a:fillRef>
           <a:effectRef idx="0">
-            <a:schemeClr val="accent1"/>
+            <a:scrgbClr r="0" g="0" b="0"/>
           </a:effectRef>
-          <a:fontRef idx="minor">
-            <a:schemeClr val="lt1"/>
-          </a:fontRef>
+          <a:fontRef idx="minor"/>
         </p:style>
         <p:txBody>
-          <a:bodyPr rtlCol="0" anchor="ctr"/>
-          <a:lstStyle/>
-          <a:p>
-            <a:pPr algn="ctr"/>
-            <a:endParaRPr lang="en-US"/>
-          </a:p>
-        </p:txBody>
-      </p:sp>
-      <p:sp>
-        <p:nvSpPr>
-          <p:cNvPr id="11" name="Rectangle 10">
-            <a:extLst>
-              <a:ext uri="{FF2B5EF4-FFF2-40B4-BE49-F238E27FC236}">
-                <a16:creationId xmlns:a16="http://schemas.microsoft.com/office/drawing/2014/main" id="{CC08B3E1-42B0-834F-A0D0-E560291C6EA5}"/>
-              </a:ext>
-            </a:extLst>
-          </p:cNvPr>
-          <p:cNvSpPr/>
-          <p:nvPr/>
-        </p:nvSpPr>
-        <p:spPr>
-          <a:xfrm>
-            <a:off x="4701922" y="1328818"/>
-            <a:ext cx="3443845" cy="3013738"/>
-          </a:xfrm>
-          <a:prstGeom prst="rect">
-            <a:avLst/>
-          </a:prstGeom>
-          <a:solidFill>
-            <a:schemeClr val="bg1"/>
-          </a:solidFill>
-          <a:ln>
-            <a:noFill/>
-          </a:ln>
-        </p:spPr>
-        <p:style>
-          <a:lnRef idx="2">
-            <a:schemeClr val="accent1">
-              <a:shade val="50000"/>
-            </a:schemeClr>
-          </a:lnRef>
-          <a:fillRef idx="1">
-            <a:schemeClr val="accent1"/>
-          </a:fillRef>
-          <a:effectRef idx="0">
-            <a:schemeClr val="accent1"/>
-          </a:effectRef>
-          <a:fontRef idx="minor">
-            <a:schemeClr val="lt1"/>
-          </a:fontRef>
-        </p:style>
-        <p:txBody>
-          <a:bodyPr rtlCol="0" anchor="ctr"/>
-          <a:lstStyle/>
-          <a:p>
-            <a:pPr algn="ctr"/>
-            <a:endParaRPr lang="en-US"/>
-          </a:p>
-        </p:txBody>
-      </p:sp>
-      <p:sp>
-        <p:nvSpPr>
-          <p:cNvPr id="12" name="Rectangle 11">
-            <a:extLst>
-              <a:ext uri="{FF2B5EF4-FFF2-40B4-BE49-F238E27FC236}">
-                <a16:creationId xmlns:a16="http://schemas.microsoft.com/office/drawing/2014/main" id="{6D5A2C4D-AAB1-5243-AAB1-58958A3C76A9}"/>
-              </a:ext>
-            </a:extLst>
-          </p:cNvPr>
-          <p:cNvSpPr/>
-          <p:nvPr/>
-        </p:nvSpPr>
-        <p:spPr>
-          <a:xfrm>
-            <a:off x="8588231" y="1253864"/>
-            <a:ext cx="3443845" cy="3051215"/>
-          </a:xfrm>
-          <a:prstGeom prst="rect">
-            <a:avLst/>
-          </a:prstGeom>
-          <a:solidFill>
-            <a:schemeClr val="bg1"/>
-          </a:solidFill>
-          <a:ln>
-            <a:noFill/>
-          </a:ln>
-        </p:spPr>
-        <p:style>
-          <a:lnRef idx="2">
-            <a:schemeClr val="accent1">
-              <a:shade val="50000"/>
-            </a:schemeClr>
-          </a:lnRef>
-          <a:fillRef idx="1">
-            <a:schemeClr val="accent1"/>
-          </a:fillRef>
-          <a:effectRef idx="0">
-            <a:schemeClr val="accent1"/>
-          </a:effectRef>
-          <a:fontRef idx="minor">
-            <a:schemeClr val="lt1"/>
-          </a:fontRef>
-        </p:style>
-        <p:txBody>
-          <a:bodyPr rtlCol="0" anchor="ctr"/>
-          <a:lstStyle/>
-          <a:p>
-            <a:pPr algn="ctr"/>
-            <a:endParaRPr lang="en-US"/>
-          </a:p>
-        </p:txBody>
-      </p:sp>
-      <p:sp>
-        <p:nvSpPr>
-          <p:cNvPr id="13" name="Rectangle 12">
-            <a:extLst>
-              <a:ext uri="{FF2B5EF4-FFF2-40B4-BE49-F238E27FC236}">
-                <a16:creationId xmlns:a16="http://schemas.microsoft.com/office/drawing/2014/main" id="{4556EDBE-87D5-6041-A1FA-D5E0BC9E7CB8}"/>
-              </a:ext>
-            </a:extLst>
-          </p:cNvPr>
-          <p:cNvSpPr/>
-          <p:nvPr/>
-        </p:nvSpPr>
-        <p:spPr>
-          <a:xfrm>
-            <a:off x="655687" y="616404"/>
-            <a:ext cx="591289" cy="472429"/>
-          </a:xfrm>
-          <a:prstGeom prst="rect">
-            <a:avLst/>
-          </a:prstGeom>
-          <a:solidFill>
-            <a:schemeClr val="bg1"/>
-          </a:solidFill>
-          <a:ln>
-            <a:noFill/>
-          </a:ln>
-        </p:spPr>
-        <p:style>
-          <a:lnRef idx="2">
-            <a:schemeClr val="accent1">
-              <a:shade val="50000"/>
-            </a:schemeClr>
-          </a:lnRef>
-          <a:fillRef idx="1">
-            <a:schemeClr val="accent1"/>
-          </a:fillRef>
-          <a:effectRef idx="0">
-            <a:schemeClr val="accent1"/>
-          </a:effectRef>
-          <a:fontRef idx="minor">
-            <a:schemeClr val="lt1"/>
-          </a:fontRef>
-        </p:style>
-        <p:txBody>
-          <a:bodyPr rtlCol="0" anchor="ctr"/>
-          <a:lstStyle/>
-          <a:p>
-            <a:pPr algn="ctr"/>
-            <a:endParaRPr lang="en-US"/>
-          </a:p>
-        </p:txBody>
-      </p:sp>
-      <p:sp>
-        <p:nvSpPr>
-          <p:cNvPr id="14" name="Rectangle 13">
-            <a:extLst>
-              <a:ext uri="{FF2B5EF4-FFF2-40B4-BE49-F238E27FC236}">
-                <a16:creationId xmlns:a16="http://schemas.microsoft.com/office/drawing/2014/main" id="{04B5CC37-3A9C-3544-8E8B-310BF2509333}"/>
-              </a:ext>
-            </a:extLst>
-          </p:cNvPr>
-          <p:cNvSpPr/>
-          <p:nvPr/>
-        </p:nvSpPr>
-        <p:spPr>
-          <a:xfrm>
-            <a:off x="5700088" y="683131"/>
-            <a:ext cx="1447512" cy="472429"/>
-          </a:xfrm>
-          <a:prstGeom prst="rect">
-            <a:avLst/>
-          </a:prstGeom>
-          <a:solidFill>
-            <a:schemeClr val="bg1"/>
-          </a:solidFill>
-          <a:ln>
-            <a:noFill/>
-          </a:ln>
-        </p:spPr>
-        <p:style>
-          <a:lnRef idx="2">
-            <a:schemeClr val="accent1">
-              <a:shade val="50000"/>
-            </a:schemeClr>
-          </a:lnRef>
-          <a:fillRef idx="1">
-            <a:schemeClr val="accent1"/>
-          </a:fillRef>
-          <a:effectRef idx="0">
-            <a:schemeClr val="accent1"/>
-          </a:effectRef>
-          <a:fontRef idx="minor">
-            <a:schemeClr val="lt1"/>
-          </a:fontRef>
-        </p:style>
-        <p:txBody>
-          <a:bodyPr rtlCol="0" anchor="ctr"/>
-          <a:lstStyle/>
-          <a:p>
-            <a:pPr algn="ctr"/>
-            <a:endParaRPr lang="en-US"/>
-          </a:p>
-        </p:txBody>
-      </p:sp>
-      <p:sp>
-        <p:nvSpPr>
-          <p:cNvPr id="15" name="Rectangle 14">
-            <a:extLst>
-              <a:ext uri="{FF2B5EF4-FFF2-40B4-BE49-F238E27FC236}">
-                <a16:creationId xmlns:a16="http://schemas.microsoft.com/office/drawing/2014/main" id="{176EF2B2-15E3-A843-B1D5-D57C0E3FF569}"/>
-              </a:ext>
-            </a:extLst>
-          </p:cNvPr>
-          <p:cNvSpPr/>
-          <p:nvPr/>
-        </p:nvSpPr>
-        <p:spPr>
-          <a:xfrm>
-            <a:off x="9315548" y="665922"/>
-            <a:ext cx="1447512" cy="472429"/>
-          </a:xfrm>
-          <a:prstGeom prst="rect">
-            <a:avLst/>
-          </a:prstGeom>
-          <a:solidFill>
-            <a:schemeClr val="bg1"/>
-          </a:solidFill>
-          <a:ln>
-            <a:noFill/>
-          </a:ln>
-        </p:spPr>
-        <p:style>
-          <a:lnRef idx="2">
-            <a:schemeClr val="accent1">
-              <a:shade val="50000"/>
-            </a:schemeClr>
-          </a:lnRef>
-          <a:fillRef idx="1">
-            <a:schemeClr val="accent1"/>
-          </a:fillRef>
-          <a:effectRef idx="0">
-            <a:schemeClr val="accent1"/>
-          </a:effectRef>
-          <a:fontRef idx="minor">
-            <a:schemeClr val="lt1"/>
-          </a:fontRef>
-        </p:style>
-        <p:txBody>
-          <a:bodyPr rtlCol="0" anchor="ctr"/>
-          <a:lstStyle/>
-          <a:p>
-            <a:pPr algn="ctr"/>
-            <a:endParaRPr lang="en-US"/>
-          </a:p>
-        </p:txBody>
-      </p:sp>
-      <p:sp>
-        <p:nvSpPr>
-          <p:cNvPr id="16" name="Rectangle 15">
-            <a:extLst>
-              <a:ext uri="{FF2B5EF4-FFF2-40B4-BE49-F238E27FC236}">
-                <a16:creationId xmlns:a16="http://schemas.microsoft.com/office/drawing/2014/main" id="{CF68DA68-0435-E94A-8600-11D9D13849D5}"/>
-              </a:ext>
-            </a:extLst>
-          </p:cNvPr>
-          <p:cNvSpPr/>
-          <p:nvPr/>
-        </p:nvSpPr>
-        <p:spPr>
-          <a:xfrm>
-            <a:off x="890649" y="4458069"/>
-            <a:ext cx="11078681" cy="596901"/>
-          </a:xfrm>
-          <a:prstGeom prst="rect">
-            <a:avLst/>
-          </a:prstGeom>
-          <a:solidFill>
-            <a:schemeClr val="bg1"/>
-          </a:solidFill>
-          <a:ln>
-            <a:noFill/>
-          </a:ln>
-        </p:spPr>
-        <p:style>
-          <a:lnRef idx="2">
-            <a:schemeClr val="accent1">
-              <a:shade val="50000"/>
-            </a:schemeClr>
-          </a:lnRef>
-          <a:fillRef idx="1">
-            <a:schemeClr val="accent1"/>
-          </a:fillRef>
-          <a:effectRef idx="0">
-            <a:schemeClr val="accent1"/>
-          </a:effectRef>
-          <a:fontRef idx="minor">
-            <a:schemeClr val="lt1"/>
-          </a:fontRef>
-        </p:style>
-        <p:txBody>
-          <a:bodyPr rtlCol="0" anchor="ctr"/>
-          <a:lstStyle/>
-          <a:p>
-            <a:pPr algn="ctr"/>
-            <a:endParaRPr lang="en-US"/>
-          </a:p>
-        </p:txBody>
-      </p:sp>
-      <p:sp>
-        <p:nvSpPr>
-          <p:cNvPr id="17" name="Rectangle 16">
-            <a:extLst>
-              <a:ext uri="{FF2B5EF4-FFF2-40B4-BE49-F238E27FC236}">
-                <a16:creationId xmlns:a16="http://schemas.microsoft.com/office/drawing/2014/main" id="{1575415E-F613-B34D-876B-20BB8450E9D0}"/>
-              </a:ext>
-            </a:extLst>
-          </p:cNvPr>
-          <p:cNvSpPr/>
-          <p:nvPr/>
-        </p:nvSpPr>
-        <p:spPr>
-          <a:xfrm>
-            <a:off x="4460686" y="616403"/>
-            <a:ext cx="591289" cy="472429"/>
-          </a:xfrm>
-          <a:prstGeom prst="rect">
-            <a:avLst/>
-          </a:prstGeom>
-          <a:solidFill>
-            <a:schemeClr val="bg1"/>
-          </a:solidFill>
-          <a:ln>
-            <a:noFill/>
-          </a:ln>
-        </p:spPr>
-        <p:style>
-          <a:lnRef idx="2">
-            <a:schemeClr val="accent1">
-              <a:shade val="50000"/>
-            </a:schemeClr>
-          </a:lnRef>
-          <a:fillRef idx="1">
-            <a:schemeClr val="accent1"/>
-          </a:fillRef>
-          <a:effectRef idx="0">
-            <a:schemeClr val="accent1"/>
-          </a:effectRef>
-          <a:fontRef idx="minor">
-            <a:schemeClr val="lt1"/>
-          </a:fontRef>
-        </p:style>
-        <p:txBody>
-          <a:bodyPr rtlCol="0" anchor="ctr"/>
-          <a:lstStyle/>
-          <a:p>
-            <a:pPr algn="ctr"/>
-            <a:endParaRPr lang="en-US"/>
-          </a:p>
-        </p:txBody>
-      </p:sp>
-      <p:sp>
-        <p:nvSpPr>
-          <p:cNvPr id="18" name="Rectangle 17">
-            <a:extLst>
-              <a:ext uri="{FF2B5EF4-FFF2-40B4-BE49-F238E27FC236}">
-                <a16:creationId xmlns:a16="http://schemas.microsoft.com/office/drawing/2014/main" id="{08E50CA7-E9A8-8C40-A98C-C30DCC0C8DF5}"/>
-              </a:ext>
-            </a:extLst>
-          </p:cNvPr>
-          <p:cNvSpPr/>
-          <p:nvPr/>
-        </p:nvSpPr>
-        <p:spPr>
-          <a:xfrm>
-            <a:off x="8286857" y="656284"/>
-            <a:ext cx="591289" cy="472429"/>
-          </a:xfrm>
-          <a:prstGeom prst="rect">
-            <a:avLst/>
-          </a:prstGeom>
-          <a:solidFill>
-            <a:schemeClr val="bg1"/>
-          </a:solidFill>
-          <a:ln>
-            <a:noFill/>
-          </a:ln>
-        </p:spPr>
-        <p:style>
-          <a:lnRef idx="2">
-            <a:schemeClr val="accent1">
-              <a:shade val="50000"/>
-            </a:schemeClr>
-          </a:lnRef>
-          <a:fillRef idx="1">
-            <a:schemeClr val="accent1"/>
-          </a:fillRef>
-          <a:effectRef idx="0">
-            <a:schemeClr val="accent1"/>
-          </a:effectRef>
-          <a:fontRef idx="minor">
-            <a:schemeClr val="lt1"/>
-          </a:fontRef>
-        </p:style>
-        <p:txBody>
-          <a:bodyPr rtlCol="0" anchor="ctr"/>
-          <a:lstStyle/>
-          <a:p>
-            <a:pPr algn="ctr"/>
-            <a:endParaRPr lang="en-US"/>
-          </a:p>
-        </p:txBody>
-      </p:sp>
-      <p:sp>
-        <p:nvSpPr>
-          <p:cNvPr id="20" name="Rectangle 19">
-            <a:extLst>
-              <a:ext uri="{FF2B5EF4-FFF2-40B4-BE49-F238E27FC236}">
-                <a16:creationId xmlns:a16="http://schemas.microsoft.com/office/drawing/2014/main" id="{B9976556-2309-A14E-8802-6EC4882519C5}"/>
-              </a:ext>
-            </a:extLst>
-          </p:cNvPr>
-          <p:cNvSpPr/>
-          <p:nvPr/>
-        </p:nvSpPr>
-        <p:spPr>
-          <a:xfrm>
-            <a:off x="2026020" y="600315"/>
-            <a:ext cx="1447512" cy="472429"/>
-          </a:xfrm>
-          <a:prstGeom prst="rect">
-            <a:avLst/>
-          </a:prstGeom>
-          <a:solidFill>
-            <a:schemeClr val="bg1"/>
-          </a:solidFill>
-          <a:ln>
-            <a:noFill/>
-          </a:ln>
-        </p:spPr>
-        <p:style>
-          <a:lnRef idx="2">
-            <a:schemeClr val="accent1">
-              <a:shade val="50000"/>
-            </a:schemeClr>
-          </a:lnRef>
-          <a:fillRef idx="1">
-            <a:schemeClr val="accent1"/>
-          </a:fillRef>
-          <a:effectRef idx="0">
-            <a:schemeClr val="accent1"/>
-          </a:effectRef>
-          <a:fontRef idx="minor">
-            <a:schemeClr val="lt1"/>
-          </a:fontRef>
-        </p:style>
-        <p:txBody>
-          <a:bodyPr rtlCol="0" anchor="ctr"/>
-          <a:lstStyle/>
-          <a:p>
-            <a:pPr algn="ctr"/>
-            <a:endParaRPr lang="en-US"/>
+          <a:bodyPr lIns="90000" tIns="45000" rIns="90000" bIns="45000"/>
+          <a:lstStyle/>
+          <a:p>
+            <a:pPr>
+              <a:lnSpc>
+                <a:spcPct val="150000"/>
+              </a:lnSpc>
+            </a:pPr>
+            <a:r>
+              <a:rPr lang="en-GB" sz="2400" strike="noStrike" spc="-1" dirty="0" err="1">
+                <a:latin typeface="Avenir"/>
+                <a:ea typeface="Avenir"/>
+              </a:rPr>
+              <a:t>Ruan</a:t>
+            </a:r>
+            <a:r>
+              <a:rPr lang="en-GB" sz="2400" strike="noStrike" spc="-1" dirty="0">
+                <a:latin typeface="Avenir"/>
+                <a:ea typeface="Avenir"/>
+              </a:rPr>
+              <a:t> van </a:t>
+            </a:r>
+            <a:r>
+              <a:rPr lang="en-GB" sz="2400" strike="noStrike" spc="-1" dirty="0" err="1">
+                <a:latin typeface="Avenir"/>
+                <a:ea typeface="Avenir"/>
+              </a:rPr>
+              <a:t>Mazijk</a:t>
+            </a:r>
+            <a:r>
+              <a:rPr lang="en-GB" sz="2400" strike="noStrike" spc="-1" dirty="0">
+                <a:latin typeface="Avenir"/>
+                <a:ea typeface="Avenir"/>
+              </a:rPr>
+              <a:t>, </a:t>
+            </a:r>
+            <a:r>
+              <a:rPr lang="en-GB" sz="2000" strike="noStrike" spc="-1" dirty="0">
+                <a:latin typeface="Avenir"/>
+                <a:ea typeface="Avenir"/>
+              </a:rPr>
+              <a:t>Michael D. Cramer &amp; G. Anthony </a:t>
+            </a:r>
+            <a:r>
+              <a:rPr lang="en-GB" sz="2000" strike="noStrike" spc="-1" dirty="0" err="1">
+                <a:latin typeface="Avenir"/>
+                <a:ea typeface="Avenir"/>
+              </a:rPr>
+              <a:t>Verboom</a:t>
+            </a:r>
+            <a:endParaRPr lang="en-GB" sz="2000" spc="-1" dirty="0">
+              <a:latin typeface="Avenir"/>
+              <a:ea typeface="Avenir"/>
+            </a:endParaRPr>
+          </a:p>
+          <a:p>
+            <a:pPr>
+              <a:lnSpc>
+                <a:spcPct val="150000"/>
+              </a:lnSpc>
+            </a:pPr>
+            <a:r>
+              <a:rPr lang="en-GB" sz="1600" spc="-1" dirty="0">
+                <a:latin typeface="Avenir"/>
+              </a:rPr>
+              <a:t>University of Cape Town</a:t>
+            </a:r>
+            <a:endParaRPr lang="en-GB" strike="noStrike" spc="-1" dirty="0">
+              <a:latin typeface="Arial"/>
+            </a:endParaRPr>
           </a:p>
         </p:txBody>
       </p:sp>
     </p:spTree>
     <p:extLst>
       <p:ext uri="{BB962C8B-B14F-4D97-AF65-F5344CB8AC3E}">
-        <p14:creationId xmlns:p14="http://schemas.microsoft.com/office/powerpoint/2010/main" val="2075350449"/>
+        <p14:creationId xmlns:p14="http://schemas.microsoft.com/office/powerpoint/2010/main" val="3058253893"/>
       </p:ext>
     </p:extLst>
   </p:cSld>
   <p:clrMapOvr>
     <a:masterClrMapping/>
   </p:clrMapOvr>
+  <p:timing>
+    <p:tnLst>
+      <p:par>
+        <p:cTn id="1" dur="indefinite" restart="never" nodeType="tmRoot">
+          <p:childTnLst>
+            <p:seq>
+              <p:cTn id="2" dur="indefinite" nodeType="mainSeq"/>
+              <p:prevCondLst>
+                <p:cond evt="onPrev" delay="0">
+                  <p:tgtEl>
+                    <p:sldTgt/>
+                  </p:tgtEl>
+                </p:cond>
+              </p:prevCondLst>
+              <p:nextCondLst>
+                <p:cond evt="onNext" delay="0">
+                  <p:tgtEl>
+                    <p:sldTgt/>
+                  </p:tgtEl>
+                </p:cond>
+              </p:nextCondLst>
+            </p:seq>
+          </p:childTnLst>
+        </p:cTn>
+      </p:par>
+    </p:tnLst>
+  </p:timing>
 </p:sld>
 </file>
 
@@ -4122,8 +3562,760 @@
         </p:blipFill>
         <p:spPr>
           <a:xfrm>
-            <a:off x="218414" y="616404"/>
-            <a:ext cx="11973586" cy="4410201"/>
+            <a:off x="163810" y="1319553"/>
+            <a:ext cx="8980190" cy="3307651"/>
+          </a:xfrm>
+          <a:prstGeom prst="rect">
+            <a:avLst/>
+          </a:prstGeom>
+        </p:spPr>
+      </p:pic>
+      <p:pic>
+        <p:nvPicPr>
+          <p:cNvPr id="5" name="Picture 4" descr="A screenshot of a cell phone&#10;&#10;Description automatically generated">
+            <a:extLst>
+              <a:ext uri="{FF2B5EF4-FFF2-40B4-BE49-F238E27FC236}">
+                <a16:creationId xmlns:a16="http://schemas.microsoft.com/office/drawing/2014/main" id="{73CD5C65-883D-764E-9077-91C9D2A7A5CA}"/>
+              </a:ext>
+            </a:extLst>
+          </p:cNvPr>
+          <p:cNvPicPr>
+            <a:picLocks noChangeAspect="1"/>
+          </p:cNvPicPr>
+          <p:nvPr/>
+        </p:nvPicPr>
+        <p:blipFill rotWithShape="1">
+          <a:blip r:embed="rId2" cstate="print">
+            <a:extLst>
+              <a:ext uri="{28A0092B-C50C-407E-A947-70E740481C1C}">
+                <a14:useLocalDpi xmlns:a14="http://schemas.microsoft.com/office/drawing/2010/main" val="0"/>
+              </a:ext>
+            </a:extLst>
+          </a:blip>
+          <a:srcRect l="89728" t="27513" b="54406"/>
+          <a:stretch/>
+        </p:blipFill>
+        <p:spPr>
+          <a:xfrm>
+            <a:off x="163811" y="5075389"/>
+            <a:ext cx="1308960" cy="767891"/>
+          </a:xfrm>
+          <a:prstGeom prst="rect">
+            <a:avLst/>
+          </a:prstGeom>
+        </p:spPr>
+      </p:pic>
+      <p:sp>
+        <p:nvSpPr>
+          <p:cNvPr id="7" name="Rectangle 6">
+            <a:extLst>
+              <a:ext uri="{FF2B5EF4-FFF2-40B4-BE49-F238E27FC236}">
+                <a16:creationId xmlns:a16="http://schemas.microsoft.com/office/drawing/2014/main" id="{E60E27A5-C6A3-AF4B-9D06-35BB43B2D3A8}"/>
+              </a:ext>
+            </a:extLst>
+          </p:cNvPr>
+          <p:cNvSpPr/>
+          <p:nvPr/>
+        </p:nvSpPr>
+        <p:spPr>
+          <a:xfrm>
+            <a:off x="602561" y="4348596"/>
+            <a:ext cx="7935686" cy="213756"/>
+          </a:xfrm>
+          <a:prstGeom prst="rect">
+            <a:avLst/>
+          </a:prstGeom>
+          <a:solidFill>
+            <a:srgbClr val="FFFFFF">
+              <a:alpha val="74902"/>
+            </a:srgbClr>
+          </a:solidFill>
+          <a:ln>
+            <a:noFill/>
+          </a:ln>
+        </p:spPr>
+        <p:style>
+          <a:lnRef idx="2">
+            <a:schemeClr val="accent1">
+              <a:shade val="50000"/>
+            </a:schemeClr>
+          </a:lnRef>
+          <a:fillRef idx="1">
+            <a:schemeClr val="accent1"/>
+          </a:fillRef>
+          <a:effectRef idx="0">
+            <a:schemeClr val="accent1"/>
+          </a:effectRef>
+          <a:fontRef idx="minor">
+            <a:schemeClr val="lt1"/>
+          </a:fontRef>
+        </p:style>
+        <p:txBody>
+          <a:bodyPr rtlCol="0" anchor="ctr"/>
+          <a:lstStyle/>
+          <a:p>
+            <a:pPr algn="ctr"/>
+            <a:endParaRPr lang="en-US" sz="1350"/>
+          </a:p>
+        </p:txBody>
+      </p:sp>
+      <p:sp>
+        <p:nvSpPr>
+          <p:cNvPr id="8" name="TextBox 7">
+            <a:extLst>
+              <a:ext uri="{FF2B5EF4-FFF2-40B4-BE49-F238E27FC236}">
+                <a16:creationId xmlns:a16="http://schemas.microsoft.com/office/drawing/2014/main" id="{CBA50735-8652-A846-BBD2-4E1521935E97}"/>
+              </a:ext>
+            </a:extLst>
+          </p:cNvPr>
+          <p:cNvSpPr txBox="1"/>
+          <p:nvPr/>
+        </p:nvSpPr>
+        <p:spPr>
+          <a:xfrm>
+            <a:off x="2866637" y="4562352"/>
+            <a:ext cx="3603872" cy="415498"/>
+          </a:xfrm>
+          <a:prstGeom prst="rect">
+            <a:avLst/>
+          </a:prstGeom>
+          <a:noFill/>
+        </p:spPr>
+        <p:txBody>
+          <a:bodyPr wrap="none" rtlCol="0">
+            <a:spAutoFit/>
+          </a:bodyPr>
+          <a:lstStyle/>
+          <a:p>
+            <a:r>
+              <a:rPr lang="en-US" sz="2100" dirty="0">
+                <a:latin typeface="Arial" panose="020B0604020202020204" pitchFamily="34" charset="0"/>
+                <a:cs typeface="Arial" panose="020B0604020202020204" pitchFamily="34" charset="0"/>
+              </a:rPr>
+              <a:t>Environmental heterogeneity</a:t>
+            </a:r>
+          </a:p>
+        </p:txBody>
+      </p:sp>
+      <p:sp>
+        <p:nvSpPr>
+          <p:cNvPr id="9" name="TextBox 8">
+            <a:extLst>
+              <a:ext uri="{FF2B5EF4-FFF2-40B4-BE49-F238E27FC236}">
+                <a16:creationId xmlns:a16="http://schemas.microsoft.com/office/drawing/2014/main" id="{F9C3705F-C19F-AF4F-A3A6-897615DC3760}"/>
+              </a:ext>
+            </a:extLst>
+          </p:cNvPr>
+          <p:cNvSpPr txBox="1"/>
+          <p:nvPr/>
+        </p:nvSpPr>
+        <p:spPr>
+          <a:xfrm rot="16200000">
+            <a:off x="-911627" y="2734875"/>
+            <a:ext cx="2215671" cy="415498"/>
+          </a:xfrm>
+          <a:prstGeom prst="rect">
+            <a:avLst/>
+          </a:prstGeom>
+          <a:solidFill>
+            <a:schemeClr val="bg1"/>
+          </a:solidFill>
+        </p:spPr>
+        <p:txBody>
+          <a:bodyPr wrap="none" rtlCol="0">
+            <a:spAutoFit/>
+          </a:bodyPr>
+          <a:lstStyle/>
+          <a:p>
+            <a:r>
+              <a:rPr lang="en-US" sz="2100" dirty="0">
+                <a:latin typeface="Arial" panose="020B0604020202020204" pitchFamily="34" charset="0"/>
+                <a:cs typeface="Arial" panose="020B0604020202020204" pitchFamily="34" charset="0"/>
+              </a:rPr>
+              <a:t>Species richness</a:t>
+            </a:r>
+          </a:p>
+        </p:txBody>
+      </p:sp>
+      <p:sp>
+        <p:nvSpPr>
+          <p:cNvPr id="2" name="Rectangle 1">
+            <a:extLst>
+              <a:ext uri="{FF2B5EF4-FFF2-40B4-BE49-F238E27FC236}">
+                <a16:creationId xmlns:a16="http://schemas.microsoft.com/office/drawing/2014/main" id="{7C509218-3BED-6043-93B1-AA96847EE66E}"/>
+              </a:ext>
+            </a:extLst>
+          </p:cNvPr>
+          <p:cNvSpPr/>
+          <p:nvPr/>
+        </p:nvSpPr>
+        <p:spPr>
+          <a:xfrm>
+            <a:off x="667987" y="1861007"/>
+            <a:ext cx="2582884" cy="2260304"/>
+          </a:xfrm>
+          <a:prstGeom prst="rect">
+            <a:avLst/>
+          </a:prstGeom>
+          <a:solidFill>
+            <a:schemeClr val="bg1"/>
+          </a:solidFill>
+          <a:ln>
+            <a:noFill/>
+          </a:ln>
+        </p:spPr>
+        <p:style>
+          <a:lnRef idx="2">
+            <a:schemeClr val="accent1">
+              <a:shade val="50000"/>
+            </a:schemeClr>
+          </a:lnRef>
+          <a:fillRef idx="1">
+            <a:schemeClr val="accent1"/>
+          </a:fillRef>
+          <a:effectRef idx="0">
+            <a:schemeClr val="accent1"/>
+          </a:effectRef>
+          <a:fontRef idx="minor">
+            <a:schemeClr val="lt1"/>
+          </a:fontRef>
+        </p:style>
+        <p:txBody>
+          <a:bodyPr rtlCol="0" anchor="ctr"/>
+          <a:lstStyle/>
+          <a:p>
+            <a:pPr algn="ctr"/>
+            <a:endParaRPr lang="en-US" sz="1350"/>
+          </a:p>
+        </p:txBody>
+      </p:sp>
+      <p:sp>
+        <p:nvSpPr>
+          <p:cNvPr id="11" name="Rectangle 10">
+            <a:extLst>
+              <a:ext uri="{FF2B5EF4-FFF2-40B4-BE49-F238E27FC236}">
+                <a16:creationId xmlns:a16="http://schemas.microsoft.com/office/drawing/2014/main" id="{CC08B3E1-42B0-834F-A0D0-E560291C6EA5}"/>
+              </a:ext>
+            </a:extLst>
+          </p:cNvPr>
+          <p:cNvSpPr/>
+          <p:nvPr/>
+        </p:nvSpPr>
+        <p:spPr>
+          <a:xfrm>
+            <a:off x="3526442" y="1853863"/>
+            <a:ext cx="2582884" cy="2260304"/>
+          </a:xfrm>
+          <a:prstGeom prst="rect">
+            <a:avLst/>
+          </a:prstGeom>
+          <a:solidFill>
+            <a:schemeClr val="bg1"/>
+          </a:solidFill>
+          <a:ln>
+            <a:noFill/>
+          </a:ln>
+        </p:spPr>
+        <p:style>
+          <a:lnRef idx="2">
+            <a:schemeClr val="accent1">
+              <a:shade val="50000"/>
+            </a:schemeClr>
+          </a:lnRef>
+          <a:fillRef idx="1">
+            <a:schemeClr val="accent1"/>
+          </a:fillRef>
+          <a:effectRef idx="0">
+            <a:schemeClr val="accent1"/>
+          </a:effectRef>
+          <a:fontRef idx="minor">
+            <a:schemeClr val="lt1"/>
+          </a:fontRef>
+        </p:style>
+        <p:txBody>
+          <a:bodyPr rtlCol="0" anchor="ctr"/>
+          <a:lstStyle/>
+          <a:p>
+            <a:pPr algn="ctr"/>
+            <a:endParaRPr lang="en-US" sz="1350"/>
+          </a:p>
+        </p:txBody>
+      </p:sp>
+      <p:sp>
+        <p:nvSpPr>
+          <p:cNvPr id="12" name="Rectangle 11">
+            <a:extLst>
+              <a:ext uri="{FF2B5EF4-FFF2-40B4-BE49-F238E27FC236}">
+                <a16:creationId xmlns:a16="http://schemas.microsoft.com/office/drawing/2014/main" id="{6D5A2C4D-AAB1-5243-AAB1-58958A3C76A9}"/>
+              </a:ext>
+            </a:extLst>
+          </p:cNvPr>
+          <p:cNvSpPr/>
+          <p:nvPr/>
+        </p:nvSpPr>
+        <p:spPr>
+          <a:xfrm>
+            <a:off x="6441174" y="1797649"/>
+            <a:ext cx="2582884" cy="2288411"/>
+          </a:xfrm>
+          <a:prstGeom prst="rect">
+            <a:avLst/>
+          </a:prstGeom>
+          <a:solidFill>
+            <a:schemeClr val="bg1"/>
+          </a:solidFill>
+          <a:ln>
+            <a:noFill/>
+          </a:ln>
+        </p:spPr>
+        <p:style>
+          <a:lnRef idx="2">
+            <a:schemeClr val="accent1">
+              <a:shade val="50000"/>
+            </a:schemeClr>
+          </a:lnRef>
+          <a:fillRef idx="1">
+            <a:schemeClr val="accent1"/>
+          </a:fillRef>
+          <a:effectRef idx="0">
+            <a:schemeClr val="accent1"/>
+          </a:effectRef>
+          <a:fontRef idx="minor">
+            <a:schemeClr val="lt1"/>
+          </a:fontRef>
+        </p:style>
+        <p:txBody>
+          <a:bodyPr rtlCol="0" anchor="ctr"/>
+          <a:lstStyle/>
+          <a:p>
+            <a:pPr algn="ctr"/>
+            <a:endParaRPr lang="en-US" sz="1350"/>
+          </a:p>
+        </p:txBody>
+      </p:sp>
+      <p:sp>
+        <p:nvSpPr>
+          <p:cNvPr id="13" name="Rectangle 12">
+            <a:extLst>
+              <a:ext uri="{FF2B5EF4-FFF2-40B4-BE49-F238E27FC236}">
+                <a16:creationId xmlns:a16="http://schemas.microsoft.com/office/drawing/2014/main" id="{4556EDBE-87D5-6041-A1FA-D5E0BC9E7CB8}"/>
+              </a:ext>
+            </a:extLst>
+          </p:cNvPr>
+          <p:cNvSpPr/>
+          <p:nvPr/>
+        </p:nvSpPr>
+        <p:spPr>
+          <a:xfrm>
+            <a:off x="491766" y="1319553"/>
+            <a:ext cx="443467" cy="354322"/>
+          </a:xfrm>
+          <a:prstGeom prst="rect">
+            <a:avLst/>
+          </a:prstGeom>
+          <a:solidFill>
+            <a:schemeClr val="bg1"/>
+          </a:solidFill>
+          <a:ln>
+            <a:noFill/>
+          </a:ln>
+        </p:spPr>
+        <p:style>
+          <a:lnRef idx="2">
+            <a:schemeClr val="accent1">
+              <a:shade val="50000"/>
+            </a:schemeClr>
+          </a:lnRef>
+          <a:fillRef idx="1">
+            <a:schemeClr val="accent1"/>
+          </a:fillRef>
+          <a:effectRef idx="0">
+            <a:schemeClr val="accent1"/>
+          </a:effectRef>
+          <a:fontRef idx="minor">
+            <a:schemeClr val="lt1"/>
+          </a:fontRef>
+        </p:style>
+        <p:txBody>
+          <a:bodyPr rtlCol="0" anchor="ctr"/>
+          <a:lstStyle/>
+          <a:p>
+            <a:pPr algn="ctr"/>
+            <a:endParaRPr lang="en-US" sz="1350"/>
+          </a:p>
+        </p:txBody>
+      </p:sp>
+      <p:sp>
+        <p:nvSpPr>
+          <p:cNvPr id="14" name="Rectangle 13">
+            <a:extLst>
+              <a:ext uri="{FF2B5EF4-FFF2-40B4-BE49-F238E27FC236}">
+                <a16:creationId xmlns:a16="http://schemas.microsoft.com/office/drawing/2014/main" id="{04B5CC37-3A9C-3544-8E8B-310BF2509333}"/>
+              </a:ext>
+            </a:extLst>
+          </p:cNvPr>
+          <p:cNvSpPr/>
+          <p:nvPr/>
+        </p:nvSpPr>
+        <p:spPr>
+          <a:xfrm>
+            <a:off x="4275066" y="1369599"/>
+            <a:ext cx="1085634" cy="354322"/>
+          </a:xfrm>
+          <a:prstGeom prst="rect">
+            <a:avLst/>
+          </a:prstGeom>
+          <a:solidFill>
+            <a:schemeClr val="bg1"/>
+          </a:solidFill>
+          <a:ln>
+            <a:noFill/>
+          </a:ln>
+        </p:spPr>
+        <p:style>
+          <a:lnRef idx="2">
+            <a:schemeClr val="accent1">
+              <a:shade val="50000"/>
+            </a:schemeClr>
+          </a:lnRef>
+          <a:fillRef idx="1">
+            <a:schemeClr val="accent1"/>
+          </a:fillRef>
+          <a:effectRef idx="0">
+            <a:schemeClr val="accent1"/>
+          </a:effectRef>
+          <a:fontRef idx="minor">
+            <a:schemeClr val="lt1"/>
+          </a:fontRef>
+        </p:style>
+        <p:txBody>
+          <a:bodyPr rtlCol="0" anchor="ctr"/>
+          <a:lstStyle/>
+          <a:p>
+            <a:pPr algn="ctr"/>
+            <a:endParaRPr lang="en-US" sz="1350"/>
+          </a:p>
+        </p:txBody>
+      </p:sp>
+      <p:sp>
+        <p:nvSpPr>
+          <p:cNvPr id="15" name="Rectangle 14">
+            <a:extLst>
+              <a:ext uri="{FF2B5EF4-FFF2-40B4-BE49-F238E27FC236}">
+                <a16:creationId xmlns:a16="http://schemas.microsoft.com/office/drawing/2014/main" id="{176EF2B2-15E3-A843-B1D5-D57C0E3FF569}"/>
+              </a:ext>
+            </a:extLst>
+          </p:cNvPr>
+          <p:cNvSpPr/>
+          <p:nvPr/>
+        </p:nvSpPr>
+        <p:spPr>
+          <a:xfrm>
+            <a:off x="6986661" y="1356692"/>
+            <a:ext cx="1085634" cy="354322"/>
+          </a:xfrm>
+          <a:prstGeom prst="rect">
+            <a:avLst/>
+          </a:prstGeom>
+          <a:solidFill>
+            <a:schemeClr val="bg1"/>
+          </a:solidFill>
+          <a:ln>
+            <a:noFill/>
+          </a:ln>
+        </p:spPr>
+        <p:style>
+          <a:lnRef idx="2">
+            <a:schemeClr val="accent1">
+              <a:shade val="50000"/>
+            </a:schemeClr>
+          </a:lnRef>
+          <a:fillRef idx="1">
+            <a:schemeClr val="accent1"/>
+          </a:fillRef>
+          <a:effectRef idx="0">
+            <a:schemeClr val="accent1"/>
+          </a:effectRef>
+          <a:fontRef idx="minor">
+            <a:schemeClr val="lt1"/>
+          </a:fontRef>
+        </p:style>
+        <p:txBody>
+          <a:bodyPr rtlCol="0" anchor="ctr"/>
+          <a:lstStyle/>
+          <a:p>
+            <a:pPr algn="ctr"/>
+            <a:endParaRPr lang="en-US" sz="1350"/>
+          </a:p>
+        </p:txBody>
+      </p:sp>
+      <p:sp>
+        <p:nvSpPr>
+          <p:cNvPr id="16" name="Rectangle 15">
+            <a:extLst>
+              <a:ext uri="{FF2B5EF4-FFF2-40B4-BE49-F238E27FC236}">
+                <a16:creationId xmlns:a16="http://schemas.microsoft.com/office/drawing/2014/main" id="{CF68DA68-0435-E94A-8600-11D9D13849D5}"/>
+              </a:ext>
+            </a:extLst>
+          </p:cNvPr>
+          <p:cNvSpPr/>
+          <p:nvPr/>
+        </p:nvSpPr>
+        <p:spPr>
+          <a:xfrm>
+            <a:off x="667987" y="4200802"/>
+            <a:ext cx="8309011" cy="447676"/>
+          </a:xfrm>
+          <a:prstGeom prst="rect">
+            <a:avLst/>
+          </a:prstGeom>
+          <a:solidFill>
+            <a:schemeClr val="bg1"/>
+          </a:solidFill>
+          <a:ln>
+            <a:noFill/>
+          </a:ln>
+        </p:spPr>
+        <p:style>
+          <a:lnRef idx="2">
+            <a:schemeClr val="accent1">
+              <a:shade val="50000"/>
+            </a:schemeClr>
+          </a:lnRef>
+          <a:fillRef idx="1">
+            <a:schemeClr val="accent1"/>
+          </a:fillRef>
+          <a:effectRef idx="0">
+            <a:schemeClr val="accent1"/>
+          </a:effectRef>
+          <a:fontRef idx="minor">
+            <a:schemeClr val="lt1"/>
+          </a:fontRef>
+        </p:style>
+        <p:txBody>
+          <a:bodyPr rtlCol="0" anchor="ctr"/>
+          <a:lstStyle/>
+          <a:p>
+            <a:pPr algn="ctr"/>
+            <a:endParaRPr lang="en-US" sz="1350"/>
+          </a:p>
+        </p:txBody>
+      </p:sp>
+      <p:sp>
+        <p:nvSpPr>
+          <p:cNvPr id="17" name="Rectangle 16">
+            <a:extLst>
+              <a:ext uri="{FF2B5EF4-FFF2-40B4-BE49-F238E27FC236}">
+                <a16:creationId xmlns:a16="http://schemas.microsoft.com/office/drawing/2014/main" id="{1575415E-F613-B34D-876B-20BB8450E9D0}"/>
+              </a:ext>
+            </a:extLst>
+          </p:cNvPr>
+          <p:cNvSpPr/>
+          <p:nvPr/>
+        </p:nvSpPr>
+        <p:spPr>
+          <a:xfrm>
+            <a:off x="3345515" y="1319553"/>
+            <a:ext cx="443467" cy="354322"/>
+          </a:xfrm>
+          <a:prstGeom prst="rect">
+            <a:avLst/>
+          </a:prstGeom>
+          <a:solidFill>
+            <a:schemeClr val="bg1"/>
+          </a:solidFill>
+          <a:ln>
+            <a:noFill/>
+          </a:ln>
+        </p:spPr>
+        <p:style>
+          <a:lnRef idx="2">
+            <a:schemeClr val="accent1">
+              <a:shade val="50000"/>
+            </a:schemeClr>
+          </a:lnRef>
+          <a:fillRef idx="1">
+            <a:schemeClr val="accent1"/>
+          </a:fillRef>
+          <a:effectRef idx="0">
+            <a:schemeClr val="accent1"/>
+          </a:effectRef>
+          <a:fontRef idx="minor">
+            <a:schemeClr val="lt1"/>
+          </a:fontRef>
+        </p:style>
+        <p:txBody>
+          <a:bodyPr rtlCol="0" anchor="ctr"/>
+          <a:lstStyle/>
+          <a:p>
+            <a:pPr algn="ctr"/>
+            <a:endParaRPr lang="en-US" sz="1350"/>
+          </a:p>
+        </p:txBody>
+      </p:sp>
+      <p:sp>
+        <p:nvSpPr>
+          <p:cNvPr id="18" name="Rectangle 17">
+            <a:extLst>
+              <a:ext uri="{FF2B5EF4-FFF2-40B4-BE49-F238E27FC236}">
+                <a16:creationId xmlns:a16="http://schemas.microsoft.com/office/drawing/2014/main" id="{08E50CA7-E9A8-8C40-A98C-C30DCC0C8DF5}"/>
+              </a:ext>
+            </a:extLst>
+          </p:cNvPr>
+          <p:cNvSpPr/>
+          <p:nvPr/>
+        </p:nvSpPr>
+        <p:spPr>
+          <a:xfrm>
+            <a:off x="6215143" y="1349463"/>
+            <a:ext cx="443467" cy="354322"/>
+          </a:xfrm>
+          <a:prstGeom prst="rect">
+            <a:avLst/>
+          </a:prstGeom>
+          <a:solidFill>
+            <a:schemeClr val="bg1"/>
+          </a:solidFill>
+          <a:ln>
+            <a:noFill/>
+          </a:ln>
+        </p:spPr>
+        <p:style>
+          <a:lnRef idx="2">
+            <a:schemeClr val="accent1">
+              <a:shade val="50000"/>
+            </a:schemeClr>
+          </a:lnRef>
+          <a:fillRef idx="1">
+            <a:schemeClr val="accent1"/>
+          </a:fillRef>
+          <a:effectRef idx="0">
+            <a:schemeClr val="accent1"/>
+          </a:effectRef>
+          <a:fontRef idx="minor">
+            <a:schemeClr val="lt1"/>
+          </a:fontRef>
+        </p:style>
+        <p:txBody>
+          <a:bodyPr rtlCol="0" anchor="ctr"/>
+          <a:lstStyle/>
+          <a:p>
+            <a:pPr algn="ctr"/>
+            <a:endParaRPr lang="en-US" sz="1350"/>
+          </a:p>
+        </p:txBody>
+      </p:sp>
+      <p:sp>
+        <p:nvSpPr>
+          <p:cNvPr id="20" name="Rectangle 19">
+            <a:extLst>
+              <a:ext uri="{FF2B5EF4-FFF2-40B4-BE49-F238E27FC236}">
+                <a16:creationId xmlns:a16="http://schemas.microsoft.com/office/drawing/2014/main" id="{B9976556-2309-A14E-8802-6EC4882519C5}"/>
+              </a:ext>
+            </a:extLst>
+          </p:cNvPr>
+          <p:cNvSpPr/>
+          <p:nvPr/>
+        </p:nvSpPr>
+        <p:spPr>
+          <a:xfrm>
+            <a:off x="1472771" y="1298280"/>
+            <a:ext cx="1085634" cy="354322"/>
+          </a:xfrm>
+          <a:prstGeom prst="rect">
+            <a:avLst/>
+          </a:prstGeom>
+          <a:solidFill>
+            <a:schemeClr val="bg1"/>
+          </a:solidFill>
+          <a:ln>
+            <a:noFill/>
+          </a:ln>
+        </p:spPr>
+        <p:style>
+          <a:lnRef idx="2">
+            <a:schemeClr val="accent1">
+              <a:shade val="50000"/>
+            </a:schemeClr>
+          </a:lnRef>
+          <a:fillRef idx="1">
+            <a:schemeClr val="accent1"/>
+          </a:fillRef>
+          <a:effectRef idx="0">
+            <a:schemeClr val="accent1"/>
+          </a:effectRef>
+          <a:fontRef idx="minor">
+            <a:schemeClr val="lt1"/>
+          </a:fontRef>
+        </p:style>
+        <p:txBody>
+          <a:bodyPr rtlCol="0" anchor="ctr"/>
+          <a:lstStyle/>
+          <a:p>
+            <a:pPr algn="ctr"/>
+            <a:endParaRPr lang="en-US" sz="1350"/>
+          </a:p>
+        </p:txBody>
+      </p:sp>
+    </p:spTree>
+    <p:extLst>
+      <p:ext uri="{BB962C8B-B14F-4D97-AF65-F5344CB8AC3E}">
+        <p14:creationId xmlns:p14="http://schemas.microsoft.com/office/powerpoint/2010/main" val="2075350449"/>
+      </p:ext>
+    </p:extLst>
+  </p:cSld>
+  <p:clrMapOvr>
+    <a:masterClrMapping/>
+  </p:clrMapOvr>
+</p:sld>
+</file>
+
+<file path=ppt/slides/slide3.xml><?xml version="1.0" encoding="utf-8"?>
+<p:sld xmlns:a="http://schemas.openxmlformats.org/drawingml/2006/main" xmlns:r="http://schemas.openxmlformats.org/officeDocument/2006/relationships" xmlns:p="http://schemas.openxmlformats.org/presentationml/2006/main">
+  <p:cSld>
+    <p:spTree>
+      <p:nvGrpSpPr>
+        <p:cNvPr id="1" name=""/>
+        <p:cNvGrpSpPr/>
+        <p:nvPr/>
+      </p:nvGrpSpPr>
+      <p:grpSpPr>
+        <a:xfrm>
+          <a:off x="0" y="0"/>
+          <a:ext cx="0" cy="0"/>
+          <a:chOff x="0" y="0"/>
+          <a:chExt cx="0" cy="0"/>
+        </a:xfrm>
+      </p:grpSpPr>
+      <p:pic>
+        <p:nvPicPr>
+          <p:cNvPr id="4" name="Picture 3" descr="A screenshot of a cell phone&#10;&#10;Description automatically generated">
+            <a:extLst>
+              <a:ext uri="{FF2B5EF4-FFF2-40B4-BE49-F238E27FC236}">
+                <a16:creationId xmlns:a16="http://schemas.microsoft.com/office/drawing/2014/main" id="{968FB5B3-0785-084B-BFD0-BA56197C26ED}"/>
+              </a:ext>
+            </a:extLst>
+          </p:cNvPr>
+          <p:cNvPicPr>
+            <a:picLocks noChangeAspect="1"/>
+          </p:cNvPicPr>
+          <p:nvPr/>
+        </p:nvPicPr>
+        <p:blipFill rotWithShape="1">
+          <a:blip r:embed="rId2" cstate="print">
+            <a:extLst>
+              <a:ext uri="{28A0092B-C50C-407E-A947-70E740481C1C}">
+                <a14:useLocalDpi xmlns:a14="http://schemas.microsoft.com/office/drawing/2010/main" val="0"/>
+              </a:ext>
+            </a:extLst>
+          </a:blip>
+          <a:srcRect r="9510"/>
+          <a:stretch/>
+        </p:blipFill>
+        <p:spPr>
+          <a:xfrm>
+            <a:off x="163810" y="1319553"/>
+            <a:ext cx="8980190" cy="3307651"/>
           </a:xfrm>
           <a:prstGeom prst="rect">
             <a:avLst/>
@@ -4146,8 +4338,8 @@
         </p:nvGrpSpPr>
         <p:grpSpPr>
           <a:xfrm>
-            <a:off x="218414" y="5624185"/>
-            <a:ext cx="3192792" cy="1023855"/>
+            <a:off x="163811" y="5075389"/>
+            <a:ext cx="2394594" cy="767891"/>
             <a:chOff x="218414" y="5617030"/>
             <a:chExt cx="2869978" cy="920336"/>
           </a:xfrm>
@@ -4237,8 +4429,8 @@
         </p:nvSpPr>
         <p:spPr>
           <a:xfrm>
-            <a:off x="803415" y="4655128"/>
-            <a:ext cx="10580914" cy="285008"/>
+            <a:off x="602561" y="4348596"/>
+            <a:ext cx="7935686" cy="213756"/>
           </a:xfrm>
           <a:prstGeom prst="rect">
             <a:avLst/>
@@ -4273,7 +4465,7 @@
           <a:lstStyle/>
           <a:p>
             <a:pPr algn="ctr"/>
-            <a:endParaRPr lang="en-US"/>
+            <a:endParaRPr lang="en-US" sz="1350"/>
           </a:p>
         </p:txBody>
       </p:sp>
@@ -4291,8 +4483,8 @@
         </p:nvSpPr>
         <p:spPr>
           <a:xfrm>
-            <a:off x="3822183" y="4940136"/>
-            <a:ext cx="4766048" cy="523220"/>
+            <a:off x="2866637" y="4562352"/>
+            <a:ext cx="3603872" cy="415498"/>
           </a:xfrm>
           <a:prstGeom prst="rect">
             <a:avLst/>
@@ -4306,7 +4498,7 @@
           <a:lstStyle/>
           <a:p>
             <a:r>
-              <a:rPr lang="en-US" sz="2800" dirty="0">
+              <a:rPr lang="en-US" sz="2100" dirty="0">
                 <a:latin typeface="Arial" panose="020B0604020202020204" pitchFamily="34" charset="0"/>
                 <a:cs typeface="Arial" panose="020B0604020202020204" pitchFamily="34" charset="0"/>
               </a:rPr>
@@ -4329,8 +4521,8 @@
         </p:nvSpPr>
         <p:spPr>
           <a:xfrm rot="16200000">
-            <a:off x="-1190069" y="2518888"/>
-            <a:ext cx="2903359" cy="523220"/>
+            <a:off x="-911627" y="2734875"/>
+            <a:ext cx="2215671" cy="415498"/>
           </a:xfrm>
           <a:prstGeom prst="rect">
             <a:avLst/>
@@ -4346,7 +4538,7 @@
           <a:lstStyle/>
           <a:p>
             <a:r>
-              <a:rPr lang="en-US" sz="2800" dirty="0">
+              <a:rPr lang="en-US" sz="2100" dirty="0">
                 <a:latin typeface="Arial" panose="020B0604020202020204" pitchFamily="34" charset="0"/>
                 <a:cs typeface="Arial" panose="020B0604020202020204" pitchFamily="34" charset="0"/>
               </a:rPr>
@@ -4369,8 +4561,8 @@
         </p:nvSpPr>
         <p:spPr>
           <a:xfrm>
-            <a:off x="1963695" y="683131"/>
-            <a:ext cx="1447512" cy="472429"/>
+            <a:off x="1472771" y="1369599"/>
+            <a:ext cx="1085634" cy="354322"/>
           </a:xfrm>
           <a:prstGeom prst="rect">
             <a:avLst/>
@@ -4403,7 +4595,7 @@
           <a:lstStyle/>
           <a:p>
             <a:pPr algn="ctr"/>
-            <a:endParaRPr lang="en-US"/>
+            <a:endParaRPr lang="en-US" sz="1350"/>
           </a:p>
         </p:txBody>
       </p:sp>
@@ -4421,8 +4613,8 @@
         </p:nvSpPr>
         <p:spPr>
           <a:xfrm>
-            <a:off x="5700088" y="683131"/>
-            <a:ext cx="1447512" cy="472429"/>
+            <a:off x="4275066" y="1369599"/>
+            <a:ext cx="1085634" cy="354322"/>
           </a:xfrm>
           <a:prstGeom prst="rect">
             <a:avLst/>
@@ -4455,7 +4647,7 @@
           <a:lstStyle/>
           <a:p>
             <a:pPr algn="ctr"/>
-            <a:endParaRPr lang="en-US"/>
+            <a:endParaRPr lang="en-US" sz="1350"/>
           </a:p>
         </p:txBody>
       </p:sp>
@@ -4473,8 +4665,8 @@
         </p:nvSpPr>
         <p:spPr>
           <a:xfrm>
-            <a:off x="9315548" y="665922"/>
-            <a:ext cx="1447512" cy="472429"/>
+            <a:off x="6986661" y="1356692"/>
+            <a:ext cx="1085634" cy="354322"/>
           </a:xfrm>
           <a:prstGeom prst="rect">
             <a:avLst/>
@@ -4507,7 +4699,7 @@
           <a:lstStyle/>
           <a:p>
             <a:pPr algn="ctr"/>
-            <a:endParaRPr lang="en-US"/>
+            <a:endParaRPr lang="en-US" sz="1350"/>
           </a:p>
         </p:txBody>
       </p:sp>
@@ -4525,8 +4717,8 @@
         </p:nvSpPr>
         <p:spPr>
           <a:xfrm>
-            <a:off x="655687" y="616404"/>
-            <a:ext cx="591289" cy="472429"/>
+            <a:off x="491766" y="1319553"/>
+            <a:ext cx="443467" cy="354322"/>
           </a:xfrm>
           <a:prstGeom prst="rect">
             <a:avLst/>
@@ -4559,7 +4751,7 @@
           <a:lstStyle/>
           <a:p>
             <a:pPr algn="ctr"/>
-            <a:endParaRPr lang="en-US"/>
+            <a:endParaRPr lang="en-US" sz="1350"/>
           </a:p>
         </p:txBody>
       </p:sp>
@@ -4577,8 +4769,8 @@
         </p:nvSpPr>
         <p:spPr>
           <a:xfrm>
-            <a:off x="4460686" y="616403"/>
-            <a:ext cx="591289" cy="472429"/>
+            <a:off x="3345515" y="1319553"/>
+            <a:ext cx="443467" cy="354322"/>
           </a:xfrm>
           <a:prstGeom prst="rect">
             <a:avLst/>
@@ -4611,7 +4803,7 @@
           <a:lstStyle/>
           <a:p>
             <a:pPr algn="ctr"/>
-            <a:endParaRPr lang="en-US"/>
+            <a:endParaRPr lang="en-US" sz="1350"/>
           </a:p>
         </p:txBody>
       </p:sp>
@@ -4629,8 +4821,8 @@
         </p:nvSpPr>
         <p:spPr>
           <a:xfrm>
-            <a:off x="8286857" y="656284"/>
-            <a:ext cx="591289" cy="472429"/>
+            <a:off x="6215143" y="1349463"/>
+            <a:ext cx="443467" cy="354322"/>
           </a:xfrm>
           <a:prstGeom prst="rect">
             <a:avLst/>
@@ -4663,7 +4855,7 @@
           <a:lstStyle/>
           <a:p>
             <a:pPr algn="ctr"/>
-            <a:endParaRPr lang="en-US"/>
+            <a:endParaRPr lang="en-US" sz="1350"/>
           </a:p>
         </p:txBody>
       </p:sp>
@@ -4680,10 +4872,345 @@
 </p:sld>
 </file>
 
+<file path=ppt/slides/slide4.xml><?xml version="1.0" encoding="utf-8"?>
+<p:sld xmlns:a="http://schemas.openxmlformats.org/drawingml/2006/main" xmlns:r="http://schemas.openxmlformats.org/officeDocument/2006/relationships" xmlns:p="http://schemas.openxmlformats.org/presentationml/2006/main">
+  <p:cSld>
+    <p:spTree>
+      <p:nvGrpSpPr>
+        <p:cNvPr id="1" name=""/>
+        <p:cNvGrpSpPr/>
+        <p:nvPr/>
+      </p:nvGrpSpPr>
+      <p:grpSpPr>
+        <a:xfrm>
+          <a:off x="0" y="0"/>
+          <a:ext cx="0" cy="0"/>
+          <a:chOff x="0" y="0"/>
+          <a:chExt cx="0" cy="0"/>
+        </a:xfrm>
+      </p:grpSpPr>
+      <p:grpSp>
+        <p:nvGrpSpPr>
+          <p:cNvPr id="5" name="Group 3">
+            <a:extLst>
+              <a:ext uri="{FF2B5EF4-FFF2-40B4-BE49-F238E27FC236}">
+                <a16:creationId xmlns:a16="http://schemas.microsoft.com/office/drawing/2014/main" id="{330FEB8E-C462-824C-B513-96F9FA621ECE}"/>
+              </a:ext>
+            </a:extLst>
+          </p:cNvPr>
+          <p:cNvGrpSpPr>
+            <a:grpSpLocks noChangeAspect="1"/>
+          </p:cNvGrpSpPr>
+          <p:nvPr/>
+        </p:nvGrpSpPr>
+        <p:grpSpPr>
+          <a:xfrm>
+            <a:off x="298110" y="5352585"/>
+            <a:ext cx="8547779" cy="1013716"/>
+            <a:chOff x="2560632" y="372495"/>
+            <a:chExt cx="6374686" cy="756000"/>
+          </a:xfrm>
+        </p:grpSpPr>
+        <p:pic>
+          <p:nvPicPr>
+            <p:cNvPr id="7" name="Google Shape;92;p13">
+              <a:extLst>
+                <a:ext uri="{FF2B5EF4-FFF2-40B4-BE49-F238E27FC236}">
+                  <a16:creationId xmlns:a16="http://schemas.microsoft.com/office/drawing/2014/main" id="{6CE196AD-6569-604E-AAA3-A9701BEDFBD3}"/>
+                </a:ext>
+              </a:extLst>
+            </p:cNvPr>
+            <p:cNvPicPr/>
+            <p:nvPr/>
+          </p:nvPicPr>
+          <p:blipFill>
+            <a:blip r:embed="rId2"/>
+            <a:stretch/>
+          </p:blipFill>
+          <p:spPr>
+            <a:xfrm>
+              <a:off x="3416146" y="372495"/>
+              <a:ext cx="746280" cy="756000"/>
+            </a:xfrm>
+            <a:prstGeom prst="rect">
+              <a:avLst/>
+            </a:prstGeom>
+            <a:ln>
+              <a:noFill/>
+            </a:ln>
+          </p:spPr>
+        </p:pic>
+        <p:pic>
+          <p:nvPicPr>
+            <p:cNvPr id="8" name="Google Shape;93;p13">
+              <a:extLst>
+                <a:ext uri="{FF2B5EF4-FFF2-40B4-BE49-F238E27FC236}">
+                  <a16:creationId xmlns:a16="http://schemas.microsoft.com/office/drawing/2014/main" id="{B6352588-A127-D04B-BBEE-EA8F2E638D00}"/>
+                </a:ext>
+              </a:extLst>
+            </p:cNvPr>
+            <p:cNvPicPr/>
+            <p:nvPr/>
+          </p:nvPicPr>
+          <p:blipFill>
+            <a:blip r:embed="rId3"/>
+            <a:stretch/>
+          </p:blipFill>
+          <p:spPr>
+            <a:xfrm>
+              <a:off x="2560632" y="372495"/>
+              <a:ext cx="736560" cy="756000"/>
+            </a:xfrm>
+            <a:prstGeom prst="rect">
+              <a:avLst/>
+            </a:prstGeom>
+            <a:ln>
+              <a:noFill/>
+            </a:ln>
+          </p:spPr>
+        </p:pic>
+        <p:pic>
+          <p:nvPicPr>
+            <p:cNvPr id="9" name="Google Shape;94;p13">
+              <a:extLst>
+                <a:ext uri="{FF2B5EF4-FFF2-40B4-BE49-F238E27FC236}">
+                  <a16:creationId xmlns:a16="http://schemas.microsoft.com/office/drawing/2014/main" id="{4382BC74-B750-BF41-81C8-03D6E90C7464}"/>
+                </a:ext>
+              </a:extLst>
+            </p:cNvPr>
+            <p:cNvPicPr>
+              <a:picLocks noChangeAspect="1"/>
+            </p:cNvPicPr>
+            <p:nvPr/>
+          </p:nvPicPr>
+          <p:blipFill>
+            <a:blip r:embed="rId4"/>
+            <a:stretch/>
+          </p:blipFill>
+          <p:spPr>
+            <a:xfrm>
+              <a:off x="5548258" y="405002"/>
+              <a:ext cx="2040411" cy="716245"/>
+            </a:xfrm>
+            <a:prstGeom prst="rect">
+              <a:avLst/>
+            </a:prstGeom>
+            <a:ln>
+              <a:noFill/>
+            </a:ln>
+          </p:spPr>
+        </p:pic>
+        <p:pic>
+          <p:nvPicPr>
+            <p:cNvPr id="10" name="Google Shape;95;p13">
+              <a:extLst>
+                <a:ext uri="{FF2B5EF4-FFF2-40B4-BE49-F238E27FC236}">
+                  <a16:creationId xmlns:a16="http://schemas.microsoft.com/office/drawing/2014/main" id="{F718AB1B-ED1B-C945-9AD1-7AAFACC910AF}"/>
+                </a:ext>
+              </a:extLst>
+            </p:cNvPr>
+            <p:cNvPicPr>
+              <a:picLocks noChangeAspect="1"/>
+            </p:cNvPicPr>
+            <p:nvPr/>
+          </p:nvPicPr>
+          <p:blipFill>
+            <a:blip r:embed="rId5"/>
+            <a:stretch/>
+          </p:blipFill>
+          <p:spPr>
+            <a:xfrm>
+              <a:off x="4231025" y="411360"/>
+              <a:ext cx="1237320" cy="706440"/>
+            </a:xfrm>
+            <a:prstGeom prst="rect">
+              <a:avLst/>
+            </a:prstGeom>
+            <a:ln>
+              <a:noFill/>
+            </a:ln>
+          </p:spPr>
+        </p:pic>
+        <p:pic>
+          <p:nvPicPr>
+            <p:cNvPr id="11" name="Google Shape;96;p13">
+              <a:extLst>
+                <a:ext uri="{FF2B5EF4-FFF2-40B4-BE49-F238E27FC236}">
+                  <a16:creationId xmlns:a16="http://schemas.microsoft.com/office/drawing/2014/main" id="{546DF1B8-7C2B-B84C-AB04-AB5D40C31473}"/>
+                </a:ext>
+              </a:extLst>
+            </p:cNvPr>
+            <p:cNvPicPr>
+              <a:picLocks noChangeAspect="1"/>
+            </p:cNvPicPr>
+            <p:nvPr/>
+          </p:nvPicPr>
+          <p:blipFill>
+            <a:blip r:embed="rId6"/>
+            <a:stretch/>
+          </p:blipFill>
+          <p:spPr>
+            <a:xfrm>
+              <a:off x="7668582" y="419079"/>
+              <a:ext cx="1266736" cy="707841"/>
+            </a:xfrm>
+            <a:prstGeom prst="rect">
+              <a:avLst/>
+            </a:prstGeom>
+            <a:ln>
+              <a:noFill/>
+            </a:ln>
+          </p:spPr>
+        </p:pic>
+      </p:grpSp>
+      <p:grpSp>
+        <p:nvGrpSpPr>
+          <p:cNvPr id="13" name="Group 12">
+            <a:extLst>
+              <a:ext uri="{FF2B5EF4-FFF2-40B4-BE49-F238E27FC236}">
+                <a16:creationId xmlns:a16="http://schemas.microsoft.com/office/drawing/2014/main" id="{B210EB32-2D77-CB43-80C6-9D50A66C3C71}"/>
+              </a:ext>
+            </a:extLst>
+          </p:cNvPr>
+          <p:cNvGrpSpPr/>
+          <p:nvPr/>
+        </p:nvGrpSpPr>
+        <p:grpSpPr>
+          <a:xfrm>
+            <a:off x="3451301" y="3213000"/>
+            <a:ext cx="2241397" cy="432000"/>
+            <a:chOff x="2304000" y="3602218"/>
+            <a:chExt cx="2241397" cy="432000"/>
+          </a:xfrm>
+        </p:grpSpPr>
+        <p:pic>
+          <p:nvPicPr>
+            <p:cNvPr id="15" name="Google Shape;57;p13">
+              <a:extLst>
+                <a:ext uri="{FF2B5EF4-FFF2-40B4-BE49-F238E27FC236}">
+                  <a16:creationId xmlns:a16="http://schemas.microsoft.com/office/drawing/2014/main" id="{A4E2BFD6-53CE-1646-AE31-7F6166D39A38}"/>
+                </a:ext>
+              </a:extLst>
+            </p:cNvPr>
+            <p:cNvPicPr>
+              <a:picLocks noChangeAspect="1"/>
+            </p:cNvPicPr>
+            <p:nvPr/>
+          </p:nvPicPr>
+          <p:blipFill>
+            <a:blip r:embed="rId7">
+              <a:biLevel thresh="75000"/>
+              <a:extLst>
+                <a:ext uri="{BEBA8EAE-BF5A-486C-A8C5-ECC9F3942E4B}">
+                  <a14:imgProps xmlns:a14="http://schemas.microsoft.com/office/drawing/2010/main">
+                    <a14:imgLayer r:embed="rId8">
+                      <a14:imgEffect>
+                        <a14:saturation sat="0"/>
+                      </a14:imgEffect>
+                    </a14:imgLayer>
+                  </a14:imgProps>
+                </a:ext>
+              </a:extLst>
+            </a:blip>
+            <a:stretch/>
+          </p:blipFill>
+          <p:spPr>
+            <a:xfrm>
+              <a:off x="2304000" y="3602218"/>
+              <a:ext cx="432000" cy="432000"/>
+            </a:xfrm>
+            <a:prstGeom prst="rect">
+              <a:avLst/>
+            </a:prstGeom>
+            <a:ln>
+              <a:noFill/>
+            </a:ln>
+          </p:spPr>
+        </p:pic>
+        <p:sp>
+          <p:nvSpPr>
+            <p:cNvPr id="16" name="CustomShape 6">
+              <a:extLst>
+                <a:ext uri="{FF2B5EF4-FFF2-40B4-BE49-F238E27FC236}">
+                  <a16:creationId xmlns:a16="http://schemas.microsoft.com/office/drawing/2014/main" id="{6F322FAE-D1B3-914C-B2B4-0B08D2FCBCC8}"/>
+                </a:ext>
+              </a:extLst>
+            </p:cNvPr>
+            <p:cNvSpPr/>
+            <p:nvPr/>
+          </p:nvSpPr>
+          <p:spPr>
+            <a:xfrm>
+              <a:off x="2640178" y="3688709"/>
+              <a:ext cx="1905219" cy="252227"/>
+            </a:xfrm>
+            <a:prstGeom prst="rect">
+              <a:avLst/>
+            </a:prstGeom>
+            <a:noFill/>
+            <a:ln>
+              <a:noFill/>
+            </a:ln>
+          </p:spPr>
+          <p:style>
+            <a:lnRef idx="0">
+              <a:scrgbClr r="0" g="0" b="0"/>
+            </a:lnRef>
+            <a:fillRef idx="0">
+              <a:scrgbClr r="0" g="0" b="0"/>
+            </a:fillRef>
+            <a:effectRef idx="0">
+              <a:scrgbClr r="0" g="0" b="0"/>
+            </a:effectRef>
+            <a:fontRef idx="minor"/>
+          </p:style>
+          <p:txBody>
+            <a:bodyPr lIns="68400" tIns="68400" rIns="68400" bIns="68400" anchor="ctr"/>
+            <a:lstStyle/>
+            <a:p>
+              <a:pPr>
+                <a:lnSpc>
+                  <a:spcPct val="100000"/>
+                </a:lnSpc>
+              </a:pPr>
+              <a:r>
+                <a:rPr lang="en-GB" sz="2400" b="0" strike="noStrike" spc="-1" dirty="0">
+                  <a:latin typeface="Avenir"/>
+                  <a:ea typeface="Avenir"/>
+                </a:rPr>
+                <a:t>@</a:t>
+              </a:r>
+              <a:r>
+                <a:rPr lang="en-GB" sz="2400" b="0" strike="noStrike" spc="-1" dirty="0" err="1">
+                  <a:latin typeface="Avenir"/>
+                  <a:ea typeface="Avenir"/>
+                </a:rPr>
+                <a:t>rvanmazijk</a:t>
+              </a:r>
+              <a:endParaRPr lang="en-GB" sz="2400" b="0" strike="noStrike" spc="-1" dirty="0">
+                <a:latin typeface="Arial"/>
+              </a:endParaRPr>
+            </a:p>
+          </p:txBody>
+        </p:sp>
+      </p:grpSp>
+    </p:spTree>
+    <p:extLst>
+      <p:ext uri="{BB962C8B-B14F-4D97-AF65-F5344CB8AC3E}">
+        <p14:creationId xmlns:p14="http://schemas.microsoft.com/office/powerpoint/2010/main" val="3909344182"/>
+      </p:ext>
+    </p:extLst>
+  </p:cSld>
+  <p:clrMapOvr>
+    <a:masterClrMapping/>
+  </p:clrMapOvr>
+</p:sld>
+</file>
+
 <file path=ppt/theme/theme1.xml><?xml version="1.0" encoding="utf-8"?>
 <a:theme xmlns:a="http://schemas.openxmlformats.org/drawingml/2006/main" name="Office Theme">
   <a:themeElements>
-    <a:clrScheme name="Office">
+    <a:clrScheme name="Office Theme">
       <a:dk1>
         <a:sysClr val="windowText" lastClr="000000"/>
       </a:dk1>
@@ -4721,7 +5248,7 @@
         <a:srgbClr val="954F72"/>
       </a:folHlink>
     </a:clrScheme>
-    <a:fontScheme name="Office">
+    <a:fontScheme name="Office Theme">
       <a:majorFont>
         <a:latin typeface="Calibri Light" panose="020F0302020204030204"/>
         <a:ea typeface=""/>
@@ -4756,23 +5283,6 @@
         <a:font script="Viet" typeface="Times New Roman"/>
         <a:font script="Uigh" typeface="Microsoft Uighur"/>
         <a:font script="Geor" typeface="Sylfaen"/>
-        <a:font script="Armn" typeface="Arial"/>
-        <a:font script="Bugi" typeface="Leelawadee UI"/>
-        <a:font script="Bopo" typeface="Microsoft JhengHei"/>
-        <a:font script="Java" typeface="Javanese Text"/>
-        <a:font script="Lisu" typeface="Segoe UI"/>
-        <a:font script="Mymr" typeface="Myanmar Text"/>
-        <a:font script="Nkoo" typeface="Ebrima"/>
-        <a:font script="Olck" typeface="Nirmala UI"/>
-        <a:font script="Osma" typeface="Ebrima"/>
-        <a:font script="Phag" typeface="Phagspa"/>
-        <a:font script="Syrn" typeface="Estrangelo Edessa"/>
-        <a:font script="Syrj" typeface="Estrangelo Edessa"/>
-        <a:font script="Syre" typeface="Estrangelo Edessa"/>
-        <a:font script="Sora" typeface="Nirmala UI"/>
-        <a:font script="Tale" typeface="Microsoft Tai Le"/>
-        <a:font script="Talu" typeface="Microsoft New Tai Lue"/>
-        <a:font script="Tfng" typeface="Ebrima"/>
       </a:majorFont>
       <a:minorFont>
         <a:latin typeface="Calibri" panose="020F0502020204030204"/>
@@ -4808,26 +5318,9 @@
         <a:font script="Viet" typeface="Arial"/>
         <a:font script="Uigh" typeface="Microsoft Uighur"/>
         <a:font script="Geor" typeface="Sylfaen"/>
-        <a:font script="Armn" typeface="Arial"/>
-        <a:font script="Bugi" typeface="Leelawadee UI"/>
-        <a:font script="Bopo" typeface="Microsoft JhengHei"/>
-        <a:font script="Java" typeface="Javanese Text"/>
-        <a:font script="Lisu" typeface="Segoe UI"/>
-        <a:font script="Mymr" typeface="Myanmar Text"/>
-        <a:font script="Nkoo" typeface="Ebrima"/>
-        <a:font script="Olck" typeface="Nirmala UI"/>
-        <a:font script="Osma" typeface="Ebrima"/>
-        <a:font script="Phag" typeface="Phagspa"/>
-        <a:font script="Syrn" typeface="Estrangelo Edessa"/>
-        <a:font script="Syrj" typeface="Estrangelo Edessa"/>
-        <a:font script="Syre" typeface="Estrangelo Edessa"/>
-        <a:font script="Sora" typeface="Nirmala UI"/>
-        <a:font script="Tale" typeface="Microsoft Tai Le"/>
-        <a:font script="Talu" typeface="Microsoft New Tai Lue"/>
-        <a:font script="Tfng" typeface="Ebrima"/>
       </a:minorFont>
     </a:fontScheme>
-    <a:fmtScheme name="Office">
+    <a:fmtScheme name="Office Theme">
       <a:fillStyleLst>
         <a:solidFill>
           <a:schemeClr val="phClr"/>

</xml_diff>

<commit_message>
Work on slides more
</commit_message>
<xml_diff>
--- a/talks/MEDECOS-2020/slides.pptx
+++ b/talks/MEDECOS-2020/slides.pptx
@@ -3442,14 +3442,14 @@
               <a:t>, </a:t>
             </a:r>
             <a:r>
-              <a:rPr lang="en-GB" sz="2000" strike="noStrike" spc="-1" dirty="0">
+              <a:rPr lang="en-GB" sz="1600" strike="noStrike" spc="-1" dirty="0">
                 <a:latin typeface="Avenir"/>
                 <a:ea typeface="Avenir"/>
               </a:rPr>
               <a:t>Michael D. Cramer &amp; G. Anthony </a:t>
             </a:r>
             <a:r>
-              <a:rPr lang="en-GB" sz="2000" strike="noStrike" spc="-1" dirty="0" err="1">
+              <a:rPr lang="en-GB" sz="1600" strike="noStrike" spc="-1" dirty="0" err="1">
                 <a:latin typeface="Avenir"/>
                 <a:ea typeface="Avenir"/>
               </a:rPr>

</xml_diff>